<commit_message>
made images more consistent
</commit_message>
<xml_diff>
--- a/requirements/examples/model_template.pptx
+++ b/requirements/examples/model_template.pptx
@@ -9,6 +9,9 @@
     <p:sldId id="257" r:id="rId3"/>
     <p:sldId id="258" r:id="rId4"/>
     <p:sldId id="259" r:id="rId5"/>
+    <p:sldId id="260" r:id="rId6"/>
+    <p:sldId id="261" r:id="rId7"/>
+    <p:sldId id="262" r:id="rId8"/>
   </p:sldIdLst>
   <p:sldSz cx="9144000" cy="6858000" type="screen4x3"/>
   <p:notesSz cx="6858000" cy="9144000"/>
@@ -107,6 +110,22 @@
       </a:defRPr>
     </a:lvl9pPr>
   </p:defaultTextStyle>
+  <p:extLst>
+    <p:ext uri="{EFAFB233-063F-42B5-8137-9DF3F51BA10A}">
+      <p15:sldGuideLst xmlns:p15="http://schemas.microsoft.com/office/powerpoint/2012/main">
+        <p15:guide id="1" orient="horz" pos="2160">
+          <p15:clr>
+            <a:srgbClr val="A4A3A4"/>
+          </p15:clr>
+        </p15:guide>
+        <p15:guide id="2" pos="2880">
+          <p15:clr>
+            <a:srgbClr val="A4A3A4"/>
+          </p15:clr>
+        </p15:guide>
+      </p15:sldGuideLst>
+    </p:ext>
+  </p:extLst>
 </p:presentation>
 </file>
 
@@ -148,10 +167,9 @@
           <a:lstStyle/>
           <a:p>
             <a:r>
-              <a:rPr lang="en-US" smtClean="0"/>
+              <a:rPr lang="en-US"/>
               <a:t>Click to edit Master title style</a:t>
             </a:r>
-            <a:endParaRPr lang="en-US"/>
           </a:p>
         </p:txBody>
       </p:sp>
@@ -267,10 +285,9 @@
           </a:lstStyle>
           <a:p>
             <a:r>
-              <a:rPr lang="en-US" smtClean="0"/>
+              <a:rPr lang="en-US"/>
               <a:t>Click to edit Master subtitle style</a:t>
             </a:r>
-            <a:endParaRPr lang="en-US"/>
           </a:p>
         </p:txBody>
       </p:sp>
@@ -291,7 +308,7 @@
           <a:p>
             <a:fld id="{804314D7-31D5-6545-8E8B-E4EAE547D6F9}" type="datetimeFigureOut">
               <a:rPr lang="en-US" smtClean="0"/>
-              <a:t>10/6/16</a:t>
+              <a:t>10/6/2016</a:t>
             </a:fld>
             <a:endParaRPr lang="en-US"/>
           </a:p>
@@ -385,10 +402,9 @@
           <a:lstStyle/>
           <a:p>
             <a:r>
-              <a:rPr lang="en-US" smtClean="0"/>
+              <a:rPr lang="en-US"/>
               <a:t>Click to edit Master title style</a:t>
             </a:r>
-            <a:endParaRPr lang="en-US"/>
           </a:p>
         </p:txBody>
       </p:sp>
@@ -409,38 +425,37 @@
           <a:p>
             <a:pPr lvl="0"/>
             <a:r>
-              <a:rPr lang="en-US" smtClean="0"/>
+              <a:rPr lang="en-US"/>
               <a:t>Click to edit Master text styles</a:t>
             </a:r>
           </a:p>
           <a:p>
             <a:pPr lvl="1"/>
             <a:r>
-              <a:rPr lang="en-US" smtClean="0"/>
+              <a:rPr lang="en-US"/>
               <a:t>Second level</a:t>
             </a:r>
           </a:p>
           <a:p>
             <a:pPr lvl="2"/>
             <a:r>
-              <a:rPr lang="en-US" smtClean="0"/>
+              <a:rPr lang="en-US"/>
               <a:t>Third level</a:t>
             </a:r>
           </a:p>
           <a:p>
             <a:pPr lvl="3"/>
             <a:r>
-              <a:rPr lang="en-US" smtClean="0"/>
+              <a:rPr lang="en-US"/>
               <a:t>Fourth level</a:t>
             </a:r>
           </a:p>
           <a:p>
             <a:pPr lvl="4"/>
             <a:r>
-              <a:rPr lang="en-US" smtClean="0"/>
+              <a:rPr lang="en-US"/>
               <a:t>Fifth level</a:t>
             </a:r>
-            <a:endParaRPr lang="en-US"/>
           </a:p>
         </p:txBody>
       </p:sp>
@@ -461,7 +476,7 @@
           <a:p>
             <a:fld id="{804314D7-31D5-6545-8E8B-E4EAE547D6F9}" type="datetimeFigureOut">
               <a:rPr lang="en-US" smtClean="0"/>
-              <a:t>10/6/16</a:t>
+              <a:t>10/6/2016</a:t>
             </a:fld>
             <a:endParaRPr lang="en-US"/>
           </a:p>
@@ -560,10 +575,9 @@
           <a:lstStyle/>
           <a:p>
             <a:r>
-              <a:rPr lang="en-US" smtClean="0"/>
+              <a:rPr lang="en-US"/>
               <a:t>Click to edit Master title style</a:t>
             </a:r>
-            <a:endParaRPr lang="en-US"/>
           </a:p>
         </p:txBody>
       </p:sp>
@@ -589,38 +603,37 @@
           <a:p>
             <a:pPr lvl="0"/>
             <a:r>
-              <a:rPr lang="en-US" smtClean="0"/>
+              <a:rPr lang="en-US"/>
               <a:t>Click to edit Master text styles</a:t>
             </a:r>
           </a:p>
           <a:p>
             <a:pPr lvl="1"/>
             <a:r>
-              <a:rPr lang="en-US" smtClean="0"/>
+              <a:rPr lang="en-US"/>
               <a:t>Second level</a:t>
             </a:r>
           </a:p>
           <a:p>
             <a:pPr lvl="2"/>
             <a:r>
-              <a:rPr lang="en-US" smtClean="0"/>
+              <a:rPr lang="en-US"/>
               <a:t>Third level</a:t>
             </a:r>
           </a:p>
           <a:p>
             <a:pPr lvl="3"/>
             <a:r>
-              <a:rPr lang="en-US" smtClean="0"/>
+              <a:rPr lang="en-US"/>
               <a:t>Fourth level</a:t>
             </a:r>
           </a:p>
           <a:p>
             <a:pPr lvl="4"/>
             <a:r>
-              <a:rPr lang="en-US" smtClean="0"/>
+              <a:rPr lang="en-US"/>
               <a:t>Fifth level</a:t>
             </a:r>
-            <a:endParaRPr lang="en-US"/>
           </a:p>
         </p:txBody>
       </p:sp>
@@ -641,7 +654,7 @@
           <a:p>
             <a:fld id="{804314D7-31D5-6545-8E8B-E4EAE547D6F9}" type="datetimeFigureOut">
               <a:rPr lang="en-US" smtClean="0"/>
-              <a:t>10/6/16</a:t>
+              <a:t>10/6/2016</a:t>
             </a:fld>
             <a:endParaRPr lang="en-US"/>
           </a:p>
@@ -735,10 +748,9 @@
           <a:lstStyle/>
           <a:p>
             <a:r>
-              <a:rPr lang="en-US" smtClean="0"/>
+              <a:rPr lang="en-US"/>
               <a:t>Click to edit Master title style</a:t>
             </a:r>
-            <a:endParaRPr lang="en-US"/>
           </a:p>
         </p:txBody>
       </p:sp>
@@ -759,38 +771,37 @@
           <a:p>
             <a:pPr lvl="0"/>
             <a:r>
-              <a:rPr lang="en-US" smtClean="0"/>
+              <a:rPr lang="en-US"/>
               <a:t>Click to edit Master text styles</a:t>
             </a:r>
           </a:p>
           <a:p>
             <a:pPr lvl="1"/>
             <a:r>
-              <a:rPr lang="en-US" smtClean="0"/>
+              <a:rPr lang="en-US"/>
               <a:t>Second level</a:t>
             </a:r>
           </a:p>
           <a:p>
             <a:pPr lvl="2"/>
             <a:r>
-              <a:rPr lang="en-US" smtClean="0"/>
+              <a:rPr lang="en-US"/>
               <a:t>Third level</a:t>
             </a:r>
           </a:p>
           <a:p>
             <a:pPr lvl="3"/>
             <a:r>
-              <a:rPr lang="en-US" smtClean="0"/>
+              <a:rPr lang="en-US"/>
               <a:t>Fourth level</a:t>
             </a:r>
           </a:p>
           <a:p>
             <a:pPr lvl="4"/>
             <a:r>
-              <a:rPr lang="en-US" smtClean="0"/>
+              <a:rPr lang="en-US"/>
               <a:t>Fifth level</a:t>
             </a:r>
-            <a:endParaRPr lang="en-US"/>
           </a:p>
         </p:txBody>
       </p:sp>
@@ -811,7 +822,7 @@
           <a:p>
             <a:fld id="{804314D7-31D5-6545-8E8B-E4EAE547D6F9}" type="datetimeFigureOut">
               <a:rPr lang="en-US" smtClean="0"/>
-              <a:t>10/6/16</a:t>
+              <a:t>10/6/2016</a:t>
             </a:fld>
             <a:endParaRPr lang="en-US"/>
           </a:p>
@@ -914,10 +925,9 @@
           </a:lstStyle>
           <a:p>
             <a:r>
-              <a:rPr lang="en-US" smtClean="0"/>
+              <a:rPr lang="en-US"/>
               <a:t>Click to edit Master title style</a:t>
             </a:r>
-            <a:endParaRPr lang="en-US"/>
           </a:p>
         </p:txBody>
       </p:sp>
@@ -1034,7 +1044,7 @@
           <a:p>
             <a:pPr lvl="0"/>
             <a:r>
-              <a:rPr lang="en-US" smtClean="0"/>
+              <a:rPr lang="en-US"/>
               <a:t>Click to edit Master text styles</a:t>
             </a:r>
           </a:p>
@@ -1057,7 +1067,7 @@
           <a:p>
             <a:fld id="{804314D7-31D5-6545-8E8B-E4EAE547D6F9}" type="datetimeFigureOut">
               <a:rPr lang="en-US" smtClean="0"/>
-              <a:t>10/6/16</a:t>
+              <a:t>10/6/2016</a:t>
             </a:fld>
             <a:endParaRPr lang="en-US"/>
           </a:p>
@@ -1151,10 +1161,9 @@
           <a:lstStyle/>
           <a:p>
             <a:r>
-              <a:rPr lang="en-US" smtClean="0"/>
+              <a:rPr lang="en-US"/>
               <a:t>Click to edit Master title style</a:t>
             </a:r>
-            <a:endParaRPr lang="en-US"/>
           </a:p>
         </p:txBody>
       </p:sp>
@@ -1208,38 +1217,37 @@
           <a:p>
             <a:pPr lvl="0"/>
             <a:r>
-              <a:rPr lang="en-US" smtClean="0"/>
+              <a:rPr lang="en-US"/>
               <a:t>Click to edit Master text styles</a:t>
             </a:r>
           </a:p>
           <a:p>
             <a:pPr lvl="1"/>
             <a:r>
-              <a:rPr lang="en-US" smtClean="0"/>
+              <a:rPr lang="en-US"/>
               <a:t>Second level</a:t>
             </a:r>
           </a:p>
           <a:p>
             <a:pPr lvl="2"/>
             <a:r>
-              <a:rPr lang="en-US" smtClean="0"/>
+              <a:rPr lang="en-US"/>
               <a:t>Third level</a:t>
             </a:r>
           </a:p>
           <a:p>
             <a:pPr lvl="3"/>
             <a:r>
-              <a:rPr lang="en-US" smtClean="0"/>
+              <a:rPr lang="en-US"/>
               <a:t>Fourth level</a:t>
             </a:r>
           </a:p>
           <a:p>
             <a:pPr lvl="4"/>
             <a:r>
-              <a:rPr lang="en-US" smtClean="0"/>
+              <a:rPr lang="en-US"/>
               <a:t>Fifth level</a:t>
             </a:r>
-            <a:endParaRPr lang="en-US"/>
           </a:p>
         </p:txBody>
       </p:sp>
@@ -1293,38 +1301,37 @@
           <a:p>
             <a:pPr lvl="0"/>
             <a:r>
-              <a:rPr lang="en-US" smtClean="0"/>
+              <a:rPr lang="en-US"/>
               <a:t>Click to edit Master text styles</a:t>
             </a:r>
           </a:p>
           <a:p>
             <a:pPr lvl="1"/>
             <a:r>
-              <a:rPr lang="en-US" smtClean="0"/>
+              <a:rPr lang="en-US"/>
               <a:t>Second level</a:t>
             </a:r>
           </a:p>
           <a:p>
             <a:pPr lvl="2"/>
             <a:r>
-              <a:rPr lang="en-US" smtClean="0"/>
+              <a:rPr lang="en-US"/>
               <a:t>Third level</a:t>
             </a:r>
           </a:p>
           <a:p>
             <a:pPr lvl="3"/>
             <a:r>
-              <a:rPr lang="en-US" smtClean="0"/>
+              <a:rPr lang="en-US"/>
               <a:t>Fourth level</a:t>
             </a:r>
           </a:p>
           <a:p>
             <a:pPr lvl="4"/>
             <a:r>
-              <a:rPr lang="en-US" smtClean="0"/>
+              <a:rPr lang="en-US"/>
               <a:t>Fifth level</a:t>
             </a:r>
-            <a:endParaRPr lang="en-US"/>
           </a:p>
         </p:txBody>
       </p:sp>
@@ -1345,7 +1352,7 @@
           <a:p>
             <a:fld id="{804314D7-31D5-6545-8E8B-E4EAE547D6F9}" type="datetimeFigureOut">
               <a:rPr lang="en-US" smtClean="0"/>
-              <a:t>10/6/16</a:t>
+              <a:t>10/6/2016</a:t>
             </a:fld>
             <a:endParaRPr lang="en-US"/>
           </a:p>
@@ -1443,10 +1450,9 @@
           </a:lstStyle>
           <a:p>
             <a:r>
-              <a:rPr lang="en-US" smtClean="0"/>
+              <a:rPr lang="en-US"/>
               <a:t>Click to edit Master title style</a:t>
             </a:r>
-            <a:endParaRPr lang="en-US"/>
           </a:p>
         </p:txBody>
       </p:sp>
@@ -1509,7 +1515,7 @@
           <a:p>
             <a:pPr lvl="0"/>
             <a:r>
-              <a:rPr lang="en-US" smtClean="0"/>
+              <a:rPr lang="en-US"/>
               <a:t>Click to edit Master text styles</a:t>
             </a:r>
           </a:p>
@@ -1565,38 +1571,37 @@
           <a:p>
             <a:pPr lvl="0"/>
             <a:r>
-              <a:rPr lang="en-US" smtClean="0"/>
+              <a:rPr lang="en-US"/>
               <a:t>Click to edit Master text styles</a:t>
             </a:r>
           </a:p>
           <a:p>
             <a:pPr lvl="1"/>
             <a:r>
-              <a:rPr lang="en-US" smtClean="0"/>
+              <a:rPr lang="en-US"/>
               <a:t>Second level</a:t>
             </a:r>
           </a:p>
           <a:p>
             <a:pPr lvl="2"/>
             <a:r>
-              <a:rPr lang="en-US" smtClean="0"/>
+              <a:rPr lang="en-US"/>
               <a:t>Third level</a:t>
             </a:r>
           </a:p>
           <a:p>
             <a:pPr lvl="3"/>
             <a:r>
-              <a:rPr lang="en-US" smtClean="0"/>
+              <a:rPr lang="en-US"/>
               <a:t>Fourth level</a:t>
             </a:r>
           </a:p>
           <a:p>
             <a:pPr lvl="4"/>
             <a:r>
-              <a:rPr lang="en-US" smtClean="0"/>
+              <a:rPr lang="en-US"/>
               <a:t>Fifth level</a:t>
             </a:r>
-            <a:endParaRPr lang="en-US"/>
           </a:p>
         </p:txBody>
       </p:sp>
@@ -1659,7 +1664,7 @@
           <a:p>
             <a:pPr lvl="0"/>
             <a:r>
-              <a:rPr lang="en-US" smtClean="0"/>
+              <a:rPr lang="en-US"/>
               <a:t>Click to edit Master text styles</a:t>
             </a:r>
           </a:p>
@@ -1715,38 +1720,37 @@
           <a:p>
             <a:pPr lvl="0"/>
             <a:r>
-              <a:rPr lang="en-US" smtClean="0"/>
+              <a:rPr lang="en-US"/>
               <a:t>Click to edit Master text styles</a:t>
             </a:r>
           </a:p>
           <a:p>
             <a:pPr lvl="1"/>
             <a:r>
-              <a:rPr lang="en-US" smtClean="0"/>
+              <a:rPr lang="en-US"/>
               <a:t>Second level</a:t>
             </a:r>
           </a:p>
           <a:p>
             <a:pPr lvl="2"/>
             <a:r>
-              <a:rPr lang="en-US" smtClean="0"/>
+              <a:rPr lang="en-US"/>
               <a:t>Third level</a:t>
             </a:r>
           </a:p>
           <a:p>
             <a:pPr lvl="3"/>
             <a:r>
-              <a:rPr lang="en-US" smtClean="0"/>
+              <a:rPr lang="en-US"/>
               <a:t>Fourth level</a:t>
             </a:r>
           </a:p>
           <a:p>
             <a:pPr lvl="4"/>
             <a:r>
-              <a:rPr lang="en-US" smtClean="0"/>
+              <a:rPr lang="en-US"/>
               <a:t>Fifth level</a:t>
             </a:r>
-            <a:endParaRPr lang="en-US"/>
           </a:p>
         </p:txBody>
       </p:sp>
@@ -1767,7 +1771,7 @@
           <a:p>
             <a:fld id="{804314D7-31D5-6545-8E8B-E4EAE547D6F9}" type="datetimeFigureOut">
               <a:rPr lang="en-US" smtClean="0"/>
-              <a:t>10/6/16</a:t>
+              <a:t>10/6/2016</a:t>
             </a:fld>
             <a:endParaRPr lang="en-US"/>
           </a:p>
@@ -1861,10 +1865,9 @@
           <a:lstStyle/>
           <a:p>
             <a:r>
-              <a:rPr lang="en-US" smtClean="0"/>
+              <a:rPr lang="en-US"/>
               <a:t>Click to edit Master title style</a:t>
             </a:r>
-            <a:endParaRPr lang="en-US"/>
           </a:p>
         </p:txBody>
       </p:sp>
@@ -1885,7 +1888,7 @@
           <a:p>
             <a:fld id="{804314D7-31D5-6545-8E8B-E4EAE547D6F9}" type="datetimeFigureOut">
               <a:rPr lang="en-US" smtClean="0"/>
-              <a:t>10/6/16</a:t>
+              <a:t>10/6/2016</a:t>
             </a:fld>
             <a:endParaRPr lang="en-US"/>
           </a:p>
@@ -1980,7 +1983,7 @@
           <a:p>
             <a:fld id="{804314D7-31D5-6545-8E8B-E4EAE547D6F9}" type="datetimeFigureOut">
               <a:rPr lang="en-US" smtClean="0"/>
-              <a:t>10/6/16</a:t>
+              <a:t>10/6/2016</a:t>
             </a:fld>
             <a:endParaRPr lang="en-US"/>
           </a:p>
@@ -2083,10 +2086,9 @@
           </a:lstStyle>
           <a:p>
             <a:r>
-              <a:rPr lang="en-US" smtClean="0"/>
+              <a:rPr lang="en-US"/>
               <a:t>Click to edit Master title style</a:t>
             </a:r>
-            <a:endParaRPr lang="en-US"/>
           </a:p>
         </p:txBody>
       </p:sp>
@@ -2140,38 +2142,37 @@
           <a:p>
             <a:pPr lvl="0"/>
             <a:r>
-              <a:rPr lang="en-US" smtClean="0"/>
+              <a:rPr lang="en-US"/>
               <a:t>Click to edit Master text styles</a:t>
             </a:r>
           </a:p>
           <a:p>
             <a:pPr lvl="1"/>
             <a:r>
-              <a:rPr lang="en-US" smtClean="0"/>
+              <a:rPr lang="en-US"/>
               <a:t>Second level</a:t>
             </a:r>
           </a:p>
           <a:p>
             <a:pPr lvl="2"/>
             <a:r>
-              <a:rPr lang="en-US" smtClean="0"/>
+              <a:rPr lang="en-US"/>
               <a:t>Third level</a:t>
             </a:r>
           </a:p>
           <a:p>
             <a:pPr lvl="3"/>
             <a:r>
-              <a:rPr lang="en-US" smtClean="0"/>
+              <a:rPr lang="en-US"/>
               <a:t>Fourth level</a:t>
             </a:r>
           </a:p>
           <a:p>
             <a:pPr lvl="4"/>
             <a:r>
-              <a:rPr lang="en-US" smtClean="0"/>
+              <a:rPr lang="en-US"/>
               <a:t>Fifth level</a:t>
             </a:r>
-            <a:endParaRPr lang="en-US"/>
           </a:p>
         </p:txBody>
       </p:sp>
@@ -2234,7 +2235,7 @@
           <a:p>
             <a:pPr lvl="0"/>
             <a:r>
-              <a:rPr lang="en-US" smtClean="0"/>
+              <a:rPr lang="en-US"/>
               <a:t>Click to edit Master text styles</a:t>
             </a:r>
           </a:p>
@@ -2257,7 +2258,7 @@
           <a:p>
             <a:fld id="{804314D7-31D5-6545-8E8B-E4EAE547D6F9}" type="datetimeFigureOut">
               <a:rPr lang="en-US" smtClean="0"/>
-              <a:t>10/6/16</a:t>
+              <a:t>10/6/2016</a:t>
             </a:fld>
             <a:endParaRPr lang="en-US"/>
           </a:p>
@@ -2360,10 +2361,9 @@
           </a:lstStyle>
           <a:p>
             <a:r>
-              <a:rPr lang="en-US" smtClean="0"/>
+              <a:rPr lang="en-US"/>
               <a:t>Click to edit Master title style</a:t>
             </a:r>
-            <a:endParaRPr lang="en-US"/>
           </a:p>
         </p:txBody>
       </p:sp>
@@ -2487,7 +2487,7 @@
           <a:p>
             <a:pPr lvl="0"/>
             <a:r>
-              <a:rPr lang="en-US" smtClean="0"/>
+              <a:rPr lang="en-US"/>
               <a:t>Click to edit Master text styles</a:t>
             </a:r>
           </a:p>
@@ -2510,7 +2510,7 @@
           <a:p>
             <a:fld id="{804314D7-31D5-6545-8E8B-E4EAE547D6F9}" type="datetimeFigureOut">
               <a:rPr lang="en-US" smtClean="0"/>
-              <a:t>10/6/16</a:t>
+              <a:t>10/6/2016</a:t>
             </a:fld>
             <a:endParaRPr lang="en-US"/>
           </a:p>
@@ -2619,10 +2619,9 @@
           <a:lstStyle/>
           <a:p>
             <a:r>
-              <a:rPr lang="en-US" smtClean="0"/>
+              <a:rPr lang="en-US"/>
               <a:t>Click to edit Master title style</a:t>
             </a:r>
-            <a:endParaRPr lang="en-US"/>
           </a:p>
         </p:txBody>
       </p:sp>
@@ -2653,38 +2652,37 @@
           <a:p>
             <a:pPr lvl="0"/>
             <a:r>
-              <a:rPr lang="en-US" smtClean="0"/>
+              <a:rPr lang="en-US"/>
               <a:t>Click to edit Master text styles</a:t>
             </a:r>
           </a:p>
           <a:p>
             <a:pPr lvl="1"/>
             <a:r>
-              <a:rPr lang="en-US" smtClean="0"/>
+              <a:rPr lang="en-US"/>
               <a:t>Second level</a:t>
             </a:r>
           </a:p>
           <a:p>
             <a:pPr lvl="2"/>
             <a:r>
-              <a:rPr lang="en-US" smtClean="0"/>
+              <a:rPr lang="en-US"/>
               <a:t>Third level</a:t>
             </a:r>
           </a:p>
           <a:p>
             <a:pPr lvl="3"/>
             <a:r>
-              <a:rPr lang="en-US" smtClean="0"/>
+              <a:rPr lang="en-US"/>
               <a:t>Fourth level</a:t>
             </a:r>
           </a:p>
           <a:p>
             <a:pPr lvl="4"/>
             <a:r>
-              <a:rPr lang="en-US" smtClean="0"/>
+              <a:rPr lang="en-US"/>
               <a:t>Fifth level</a:t>
             </a:r>
-            <a:endParaRPr lang="en-US"/>
           </a:p>
         </p:txBody>
       </p:sp>
@@ -2723,7 +2721,7 @@
           <a:p>
             <a:fld id="{804314D7-31D5-6545-8E8B-E4EAE547D6F9}" type="datetimeFigureOut">
               <a:rPr lang="en-US" smtClean="0"/>
-              <a:t>10/6/16</a:t>
+              <a:t>10/6/2016</a:t>
             </a:fld>
             <a:endParaRPr lang="en-US"/>
           </a:p>
@@ -3140,18 +3138,13 @@
           <a:p>
             <a:pPr algn="ctr"/>
             <a:r>
-              <a:rPr lang="en-US" sz="1200" dirty="0" smtClean="0">
+              <a:rPr lang="en-US" sz="1200" dirty="0">
                 <a:solidFill>
                   <a:srgbClr val="000000"/>
                 </a:solidFill>
               </a:rPr>
               <a:t>TEXT</a:t>
             </a:r>
-            <a:endParaRPr lang="en-US" sz="1200" dirty="0">
-              <a:solidFill>
-                <a:srgbClr val="000000"/>
-              </a:solidFill>
-            </a:endParaRPr>
           </a:p>
         </p:txBody>
       </p:sp>
@@ -3197,18 +3190,13 @@
           <a:p>
             <a:pPr algn="ctr"/>
             <a:r>
-              <a:rPr lang="en-US" sz="1200" dirty="0" smtClean="0">
+              <a:rPr lang="en-US" sz="1200" dirty="0">
                 <a:solidFill>
                   <a:srgbClr val="000000"/>
                 </a:solidFill>
               </a:rPr>
               <a:t>TEXT</a:t>
             </a:r>
-            <a:endParaRPr lang="en-US" sz="1200" dirty="0">
-              <a:solidFill>
-                <a:srgbClr val="000000"/>
-              </a:solidFill>
-            </a:endParaRPr>
           </a:p>
         </p:txBody>
       </p:sp>
@@ -3284,18 +3272,13 @@
           <a:p>
             <a:pPr algn="ctr"/>
             <a:r>
-              <a:rPr lang="en-US" sz="1200" dirty="0" smtClean="0">
+              <a:rPr lang="en-US" sz="1200" dirty="0">
                 <a:solidFill>
                   <a:srgbClr val="000000"/>
                 </a:solidFill>
               </a:rPr>
               <a:t>Capture image as input</a:t>
             </a:r>
-            <a:endParaRPr lang="en-US" sz="1200" dirty="0">
-              <a:solidFill>
-                <a:srgbClr val="000000"/>
-              </a:solidFill>
-            </a:endParaRPr>
           </a:p>
         </p:txBody>
       </p:sp>
@@ -3341,18 +3324,13 @@
           <a:p>
             <a:pPr algn="ctr"/>
             <a:r>
-              <a:rPr lang="en-US" sz="1200" dirty="0" smtClean="0">
+              <a:rPr lang="en-US" sz="1200" dirty="0">
                 <a:solidFill>
                   <a:srgbClr val="000000"/>
                 </a:solidFill>
               </a:rPr>
               <a:t>Human</a:t>
             </a:r>
-            <a:endParaRPr lang="en-US" sz="1200" dirty="0">
-              <a:solidFill>
-                <a:srgbClr val="000000"/>
-              </a:solidFill>
-            </a:endParaRPr>
           </a:p>
         </p:txBody>
       </p:sp>
@@ -3398,18 +3376,13 @@
           <a:p>
             <a:pPr algn="ctr"/>
             <a:r>
-              <a:rPr lang="en-US" sz="1200" dirty="0" smtClean="0">
+              <a:rPr lang="en-US" sz="1200" dirty="0">
                 <a:solidFill>
                   <a:srgbClr val="000000"/>
                 </a:solidFill>
               </a:rPr>
               <a:t>Image</a:t>
             </a:r>
-            <a:endParaRPr lang="en-US" sz="1200" dirty="0">
-              <a:solidFill>
-                <a:srgbClr val="000000"/>
-              </a:solidFill>
-            </a:endParaRPr>
           </a:p>
         </p:txBody>
       </p:sp>
@@ -3455,18 +3428,13 @@
           <a:p>
             <a:pPr algn="ctr"/>
             <a:r>
-              <a:rPr lang="en-US" sz="1200" dirty="0" smtClean="0">
+              <a:rPr lang="en-US" sz="1200" dirty="0">
                 <a:solidFill>
                   <a:srgbClr val="000000"/>
                 </a:solidFill>
               </a:rPr>
               <a:t>Process image for robot system</a:t>
             </a:r>
-            <a:endParaRPr lang="en-US" sz="1200" dirty="0">
-              <a:solidFill>
-                <a:srgbClr val="000000"/>
-              </a:solidFill>
-            </a:endParaRPr>
           </a:p>
         </p:txBody>
       </p:sp>
@@ -3512,18 +3480,13 @@
           <a:p>
             <a:pPr algn="ctr"/>
             <a:r>
-              <a:rPr lang="en-US" sz="1200" dirty="0" smtClean="0">
+              <a:rPr lang="en-US" sz="1200" dirty="0">
                 <a:solidFill>
                   <a:srgbClr val="000000"/>
                 </a:solidFill>
               </a:rPr>
               <a:t>Processing error</a:t>
             </a:r>
-            <a:endParaRPr lang="en-US" sz="1200" dirty="0">
-              <a:solidFill>
-                <a:srgbClr val="000000"/>
-              </a:solidFill>
-            </a:endParaRPr>
           </a:p>
         </p:txBody>
       </p:sp>
@@ -3794,16 +3757,15 @@
           <a:lstStyle/>
           <a:p>
             <a:r>
-              <a:rPr lang="en-US" dirty="0" smtClean="0"/>
+              <a:rPr lang="en-US" dirty="0"/>
               <a:t>Use case:</a:t>
             </a:r>
           </a:p>
           <a:p>
             <a:r>
-              <a:rPr lang="en-US" dirty="0" smtClean="0"/>
+              <a:rPr lang="en-US" dirty="0"/>
               <a:t>Process input image</a:t>
             </a:r>
-            <a:endParaRPr lang="en-US" dirty="0"/>
           </a:p>
         </p:txBody>
       </p:sp>
@@ -3879,18 +3841,13 @@
           <a:p>
             <a:pPr algn="ctr"/>
             <a:r>
-              <a:rPr lang="en-US" sz="1200" dirty="0" smtClean="0">
+              <a:rPr lang="en-US" sz="1200" dirty="0">
                 <a:solidFill>
                   <a:srgbClr val="000000"/>
                 </a:solidFill>
               </a:rPr>
               <a:t>Capture scene</a:t>
             </a:r>
-            <a:endParaRPr lang="en-US" sz="1200" dirty="0">
-              <a:solidFill>
-                <a:srgbClr val="000000"/>
-              </a:solidFill>
-            </a:endParaRPr>
           </a:p>
         </p:txBody>
       </p:sp>
@@ -3936,18 +3893,13 @@
           <a:p>
             <a:pPr algn="ctr"/>
             <a:r>
-              <a:rPr lang="en-US" sz="1200" dirty="0" smtClean="0">
+              <a:rPr lang="en-US" sz="1200" dirty="0">
                 <a:solidFill>
                   <a:srgbClr val="000000"/>
                 </a:solidFill>
               </a:rPr>
               <a:t>Environment</a:t>
             </a:r>
-            <a:endParaRPr lang="en-US" sz="1200" dirty="0">
-              <a:solidFill>
-                <a:srgbClr val="000000"/>
-              </a:solidFill>
-            </a:endParaRPr>
           </a:p>
         </p:txBody>
       </p:sp>
@@ -3993,18 +3945,13 @@
           <a:p>
             <a:pPr algn="ctr"/>
             <a:r>
-              <a:rPr lang="en-US" sz="1200" dirty="0" smtClean="0">
+              <a:rPr lang="en-US" sz="1200" dirty="0">
                 <a:solidFill>
                   <a:srgbClr val="000000"/>
                 </a:solidFill>
               </a:rPr>
               <a:t>Feature detection</a:t>
             </a:r>
-            <a:endParaRPr lang="en-US" sz="1200" dirty="0">
-              <a:solidFill>
-                <a:srgbClr val="000000"/>
-              </a:solidFill>
-            </a:endParaRPr>
           </a:p>
         </p:txBody>
       </p:sp>
@@ -4050,18 +3997,13 @@
           <a:p>
             <a:pPr algn="ctr"/>
             <a:r>
-              <a:rPr lang="en-US" sz="1200" dirty="0" smtClean="0">
+              <a:rPr lang="en-US" sz="1200" dirty="0">
                 <a:solidFill>
                   <a:srgbClr val="000000"/>
                 </a:solidFill>
               </a:rPr>
               <a:t>Localization error</a:t>
             </a:r>
-            <a:endParaRPr lang="en-US" sz="1200" dirty="0">
-              <a:solidFill>
-                <a:srgbClr val="000000"/>
-              </a:solidFill>
-            </a:endParaRPr>
           </a:p>
         </p:txBody>
       </p:sp>
@@ -4233,18 +4175,13 @@
           <a:p>
             <a:pPr algn="ctr"/>
             <a:r>
-              <a:rPr lang="en-US" sz="1200" dirty="0" smtClean="0">
+              <a:rPr lang="en-US" sz="1200" dirty="0">
                 <a:solidFill>
                   <a:srgbClr val="000000"/>
                 </a:solidFill>
               </a:rPr>
               <a:t>Imaging Sensor</a:t>
             </a:r>
-            <a:endParaRPr lang="en-US" sz="1200" dirty="0">
-              <a:solidFill>
-                <a:srgbClr val="000000"/>
-              </a:solidFill>
-            </a:endParaRPr>
           </a:p>
         </p:txBody>
       </p:sp>
@@ -4329,18 +4266,13 @@
           <a:p>
             <a:pPr algn="ctr"/>
             <a:r>
-              <a:rPr lang="en-US" sz="1200" dirty="0" smtClean="0">
+              <a:rPr lang="en-US" sz="1200" dirty="0">
                 <a:solidFill>
                   <a:srgbClr val="000000"/>
                 </a:solidFill>
               </a:rPr>
               <a:t>Localization update</a:t>
             </a:r>
-            <a:endParaRPr lang="en-US" sz="1200" dirty="0">
-              <a:solidFill>
-                <a:srgbClr val="000000"/>
-              </a:solidFill>
-            </a:endParaRPr>
           </a:p>
         </p:txBody>
       </p:sp>
@@ -4425,18 +4357,13 @@
           <a:p>
             <a:pPr algn="ctr"/>
             <a:r>
-              <a:rPr lang="en-US" sz="1200" dirty="0" smtClean="0">
+              <a:rPr lang="en-US" sz="1200" dirty="0">
                 <a:solidFill>
                   <a:srgbClr val="000000"/>
                 </a:solidFill>
               </a:rPr>
               <a:t>Broadcast to robot agents</a:t>
             </a:r>
-            <a:endParaRPr lang="en-US" sz="1200" dirty="0">
-              <a:solidFill>
-                <a:srgbClr val="000000"/>
-              </a:solidFill>
-            </a:endParaRPr>
           </a:p>
         </p:txBody>
       </p:sp>
@@ -4619,16 +4546,15 @@
           <a:lstStyle/>
           <a:p>
             <a:r>
-              <a:rPr lang="en-US" dirty="0" smtClean="0"/>
+              <a:rPr lang="en-US" dirty="0"/>
               <a:t>Use case:</a:t>
             </a:r>
           </a:p>
           <a:p>
             <a:r>
-              <a:rPr lang="en-US" dirty="0" smtClean="0"/>
+              <a:rPr lang="en-US" dirty="0"/>
               <a:t>localization</a:t>
             </a:r>
-            <a:endParaRPr lang="en-US" dirty="0"/>
           </a:p>
         </p:txBody>
       </p:sp>
@@ -4704,18 +4630,13 @@
           <a:p>
             <a:pPr algn="ctr"/>
             <a:r>
-              <a:rPr lang="en-US" sz="1200" dirty="0" smtClean="0">
+              <a:rPr lang="en-US" sz="1200" dirty="0">
                 <a:solidFill>
                   <a:srgbClr val="000000"/>
                 </a:solidFill>
               </a:rPr>
               <a:t>Move tool to surface</a:t>
             </a:r>
-            <a:endParaRPr lang="en-US" sz="1200" dirty="0">
-              <a:solidFill>
-                <a:srgbClr val="000000"/>
-              </a:solidFill>
-            </a:endParaRPr>
           </a:p>
         </p:txBody>
       </p:sp>
@@ -4761,18 +4682,13 @@
           <a:p>
             <a:pPr algn="ctr"/>
             <a:r>
-              <a:rPr lang="en-US" sz="1200" dirty="0" smtClean="0">
+              <a:rPr lang="en-US" sz="1200" dirty="0">
                 <a:solidFill>
                   <a:srgbClr val="000000"/>
                 </a:solidFill>
               </a:rPr>
               <a:t>Writing Surface</a:t>
             </a:r>
-            <a:endParaRPr lang="en-US" sz="1200" dirty="0">
-              <a:solidFill>
-                <a:srgbClr val="000000"/>
-              </a:solidFill>
-            </a:endParaRPr>
           </a:p>
         </p:txBody>
       </p:sp>
@@ -4867,18 +4783,13 @@
           <a:p>
             <a:pPr algn="ctr"/>
             <a:r>
-              <a:rPr lang="en-US" sz="1200" dirty="0" smtClean="0">
+              <a:rPr lang="en-US" sz="1200" dirty="0">
                 <a:solidFill>
                   <a:srgbClr val="000000"/>
                 </a:solidFill>
               </a:rPr>
               <a:t>Writing Tool</a:t>
             </a:r>
-            <a:endParaRPr lang="en-US" sz="1200" dirty="0">
-              <a:solidFill>
-                <a:srgbClr val="000000"/>
-              </a:solidFill>
-            </a:endParaRPr>
           </a:p>
         </p:txBody>
       </p:sp>
@@ -4924,18 +4835,13 @@
           <a:p>
             <a:pPr algn="ctr"/>
             <a:r>
-              <a:rPr lang="en-US" sz="1200" dirty="0" smtClean="0">
+              <a:rPr lang="en-US" sz="1200" dirty="0">
                 <a:solidFill>
                   <a:srgbClr val="000000"/>
                 </a:solidFill>
               </a:rPr>
               <a:t>Image and localization comparison</a:t>
             </a:r>
-            <a:endParaRPr lang="en-US" sz="1200" dirty="0">
-              <a:solidFill>
-                <a:srgbClr val="000000"/>
-              </a:solidFill>
-            </a:endParaRPr>
           </a:p>
         </p:txBody>
       </p:sp>
@@ -5061,16 +4967,15 @@
           <a:lstStyle/>
           <a:p>
             <a:r>
-              <a:rPr lang="en-US" dirty="0" smtClean="0"/>
+              <a:rPr lang="en-US" dirty="0"/>
               <a:t>Use case:</a:t>
             </a:r>
           </a:p>
           <a:p>
             <a:r>
-              <a:rPr lang="en-US" dirty="0" smtClean="0"/>
+              <a:rPr lang="en-US" dirty="0"/>
               <a:t>Use writing implement</a:t>
             </a:r>
-            <a:endParaRPr lang="en-US" dirty="0"/>
           </a:p>
         </p:txBody>
       </p:sp>
@@ -5078,6 +4983,1366 @@
     <p:extLst>
       <p:ext uri="{BB962C8B-B14F-4D97-AF65-F5344CB8AC3E}">
         <p14:creationId xmlns:p14="http://schemas.microsoft.com/office/powerpoint/2010/main" val="3827980004"/>
+      </p:ext>
+    </p:extLst>
+  </p:cSld>
+  <p:clrMapOvr>
+    <a:masterClrMapping/>
+  </p:clrMapOvr>
+</p:sld>
+</file>
+
+<file path=ppt/slides/slide5.xml><?xml version="1.0" encoding="utf-8"?>
+<p:sld xmlns:a="http://schemas.openxmlformats.org/drawingml/2006/main" xmlns:r="http://schemas.openxmlformats.org/officeDocument/2006/relationships" xmlns:p="http://schemas.openxmlformats.org/presentationml/2006/main">
+  <p:cSld>
+    <p:spTree>
+      <p:nvGrpSpPr>
+        <p:cNvPr id="1" name=""/>
+        <p:cNvGrpSpPr/>
+        <p:nvPr/>
+      </p:nvGrpSpPr>
+      <p:grpSpPr>
+        <a:xfrm>
+          <a:off x="0" y="0"/>
+          <a:ext cx="0" cy="0"/>
+          <a:chOff x="0" y="0"/>
+          <a:chExt cx="0" cy="0"/>
+        </a:xfrm>
+      </p:grpSpPr>
+      <p:sp>
+        <p:nvSpPr>
+          <p:cNvPr id="8" name="Rectangle 7"/>
+          <p:cNvSpPr/>
+          <p:nvPr/>
+        </p:nvSpPr>
+        <p:spPr>
+          <a:xfrm>
+            <a:off x="4790210" y="2397151"/>
+            <a:ext cx="694706" cy="694706"/>
+          </a:xfrm>
+          <a:prstGeom prst="rect">
+            <a:avLst/>
+          </a:prstGeom>
+          <a:solidFill>
+            <a:schemeClr val="bg1"/>
+          </a:solidFill>
+          <a:ln>
+            <a:solidFill>
+              <a:schemeClr val="tx1"/>
+            </a:solidFill>
+          </a:ln>
+        </p:spPr>
+        <p:style>
+          <a:lnRef idx="2">
+            <a:schemeClr val="accent1">
+              <a:shade val="50000"/>
+            </a:schemeClr>
+          </a:lnRef>
+          <a:fillRef idx="1">
+            <a:schemeClr val="accent1"/>
+          </a:fillRef>
+          <a:effectRef idx="0">
+            <a:schemeClr val="accent1"/>
+          </a:effectRef>
+          <a:fontRef idx="minor">
+            <a:schemeClr val="lt1"/>
+          </a:fontRef>
+        </p:style>
+        <p:txBody>
+          <a:bodyPr rot="0" spcFirstLastPara="0" vertOverflow="overflow" horzOverflow="overflow" vert="horz" wrap="square" lIns="68580" tIns="34290" rIns="68580" bIns="34290" numCol="1" spcCol="0" rtlCol="0" fromWordArt="0" anchor="ctr" anchorCtr="0" forceAA="0" compatLnSpc="1">
+            <a:prstTxWarp prst="textNoShape">
+              <a:avLst/>
+            </a:prstTxWarp>
+            <a:noAutofit/>
+          </a:bodyPr>
+          <a:lstStyle/>
+          <a:p>
+            <a:pPr algn="ctr"/>
+            <a:r>
+              <a:rPr lang="en-US" sz="900" dirty="0">
+                <a:solidFill>
+                  <a:schemeClr val="tx1"/>
+                </a:solidFill>
+              </a:rPr>
+              <a:t>Writing tool holder</a:t>
+            </a:r>
+          </a:p>
+        </p:txBody>
+      </p:sp>
+      <p:sp>
+        <p:nvSpPr>
+          <p:cNvPr id="9" name="Oval 8"/>
+          <p:cNvSpPr/>
+          <p:nvPr/>
+        </p:nvSpPr>
+        <p:spPr>
+          <a:xfrm>
+            <a:off x="3326575" y="2388244"/>
+            <a:ext cx="703613" cy="703613"/>
+          </a:xfrm>
+          <a:prstGeom prst="ellipse">
+            <a:avLst/>
+          </a:prstGeom>
+          <a:solidFill>
+            <a:schemeClr val="bg1"/>
+          </a:solidFill>
+          <a:ln>
+            <a:solidFill>
+              <a:schemeClr val="tx1"/>
+            </a:solidFill>
+          </a:ln>
+        </p:spPr>
+        <p:style>
+          <a:lnRef idx="2">
+            <a:schemeClr val="accent1">
+              <a:shade val="50000"/>
+            </a:schemeClr>
+          </a:lnRef>
+          <a:fillRef idx="1">
+            <a:schemeClr val="accent1"/>
+          </a:fillRef>
+          <a:effectRef idx="0">
+            <a:schemeClr val="accent1"/>
+          </a:effectRef>
+          <a:fontRef idx="minor">
+            <a:schemeClr val="lt1"/>
+          </a:fontRef>
+        </p:style>
+        <p:txBody>
+          <a:bodyPr rot="0" spcFirstLastPara="0" vertOverflow="overflow" horzOverflow="overflow" vert="horz" wrap="square" lIns="68580" tIns="34290" rIns="68580" bIns="34290" numCol="1" spcCol="0" rtlCol="0" fromWordArt="0" anchor="ctr" anchorCtr="0" forceAA="0" compatLnSpc="1">
+            <a:prstTxWarp prst="textNoShape">
+              <a:avLst/>
+            </a:prstTxWarp>
+            <a:noAutofit/>
+          </a:bodyPr>
+          <a:lstStyle/>
+          <a:p>
+            <a:pPr algn="ctr"/>
+            <a:r>
+              <a:rPr lang="en-US" sz="900" dirty="0">
+                <a:solidFill>
+                  <a:schemeClr val="tx1"/>
+                </a:solidFill>
+              </a:rPr>
+              <a:t>Writing Tool</a:t>
+            </a:r>
+          </a:p>
+        </p:txBody>
+      </p:sp>
+      <p:sp>
+        <p:nvSpPr>
+          <p:cNvPr id="10" name="Oval 9"/>
+          <p:cNvSpPr/>
+          <p:nvPr/>
+        </p:nvSpPr>
+        <p:spPr>
+          <a:xfrm>
+            <a:off x="3326575" y="3744002"/>
+            <a:ext cx="703613" cy="703613"/>
+          </a:xfrm>
+          <a:prstGeom prst="ellipse">
+            <a:avLst/>
+          </a:prstGeom>
+          <a:solidFill>
+            <a:schemeClr val="bg1"/>
+          </a:solidFill>
+          <a:ln>
+            <a:solidFill>
+              <a:schemeClr val="tx1"/>
+            </a:solidFill>
+          </a:ln>
+        </p:spPr>
+        <p:style>
+          <a:lnRef idx="2">
+            <a:schemeClr val="accent1">
+              <a:shade val="50000"/>
+            </a:schemeClr>
+          </a:lnRef>
+          <a:fillRef idx="1">
+            <a:schemeClr val="accent1"/>
+          </a:fillRef>
+          <a:effectRef idx="0">
+            <a:schemeClr val="accent1"/>
+          </a:effectRef>
+          <a:fontRef idx="minor">
+            <a:schemeClr val="lt1"/>
+          </a:fontRef>
+        </p:style>
+        <p:txBody>
+          <a:bodyPr rot="0" spcFirstLastPara="0" vertOverflow="overflow" horzOverflow="overflow" vert="horz" wrap="square" lIns="68580" tIns="34290" rIns="68580" bIns="34290" numCol="1" spcCol="0" rtlCol="0" fromWordArt="0" anchor="ctr" anchorCtr="0" forceAA="0" compatLnSpc="1">
+            <a:prstTxWarp prst="textNoShape">
+              <a:avLst/>
+            </a:prstTxWarp>
+            <a:noAutofit/>
+          </a:bodyPr>
+          <a:lstStyle/>
+          <a:p>
+            <a:pPr algn="ctr"/>
+            <a:r>
+              <a:rPr lang="en-US" sz="900" dirty="0">
+                <a:solidFill>
+                  <a:schemeClr val="tx1"/>
+                </a:solidFill>
+              </a:rPr>
+              <a:t>Human</a:t>
+            </a:r>
+          </a:p>
+        </p:txBody>
+      </p:sp>
+      <p:sp>
+        <p:nvSpPr>
+          <p:cNvPr id="11" name="Rectangle 10"/>
+          <p:cNvSpPr/>
+          <p:nvPr/>
+        </p:nvSpPr>
+        <p:spPr>
+          <a:xfrm>
+            <a:off x="4790210" y="3744002"/>
+            <a:ext cx="694706" cy="694706"/>
+          </a:xfrm>
+          <a:prstGeom prst="rect">
+            <a:avLst/>
+          </a:prstGeom>
+          <a:solidFill>
+            <a:schemeClr val="bg1"/>
+          </a:solidFill>
+          <a:ln>
+            <a:solidFill>
+              <a:schemeClr val="tx1"/>
+            </a:solidFill>
+          </a:ln>
+        </p:spPr>
+        <p:style>
+          <a:lnRef idx="2">
+            <a:schemeClr val="accent1">
+              <a:shade val="50000"/>
+            </a:schemeClr>
+          </a:lnRef>
+          <a:fillRef idx="1">
+            <a:schemeClr val="accent1"/>
+          </a:fillRef>
+          <a:effectRef idx="0">
+            <a:schemeClr val="accent1"/>
+          </a:effectRef>
+          <a:fontRef idx="minor">
+            <a:schemeClr val="lt1"/>
+          </a:fontRef>
+        </p:style>
+        <p:txBody>
+          <a:bodyPr rot="0" spcFirstLastPara="0" vertOverflow="overflow" horzOverflow="overflow" vert="horz" wrap="square" lIns="68580" tIns="34290" rIns="68580" bIns="34290" numCol="1" spcCol="0" rtlCol="0" fromWordArt="0" anchor="ctr" anchorCtr="0" forceAA="0" compatLnSpc="1">
+            <a:prstTxWarp prst="textNoShape">
+              <a:avLst/>
+            </a:prstTxWarp>
+            <a:noAutofit/>
+          </a:bodyPr>
+          <a:lstStyle/>
+          <a:p>
+            <a:pPr algn="ctr"/>
+            <a:r>
+              <a:rPr lang="en-US" sz="900" dirty="0">
+                <a:solidFill>
+                  <a:schemeClr val="tx1"/>
+                </a:solidFill>
+              </a:rPr>
+              <a:t>Writing tool release control</a:t>
+            </a:r>
+          </a:p>
+        </p:txBody>
+      </p:sp>
+      <p:cxnSp>
+        <p:nvCxnSpPr>
+          <p:cNvPr id="14" name="Straight Connector 13"/>
+          <p:cNvCxnSpPr>
+            <a:stCxn id="10" idx="6"/>
+            <a:endCxn id="11" idx="1"/>
+          </p:cNvCxnSpPr>
+          <p:nvPr/>
+        </p:nvCxnSpPr>
+        <p:spPr>
+          <a:xfrm flipV="1">
+            <a:off x="4030187" y="4091355"/>
+            <a:ext cx="760023" cy="4454"/>
+          </a:xfrm>
+          <a:prstGeom prst="line">
+            <a:avLst/>
+          </a:prstGeom>
+          <a:ln>
+            <a:solidFill>
+              <a:schemeClr val="tx1"/>
+            </a:solidFill>
+          </a:ln>
+        </p:spPr>
+        <p:style>
+          <a:lnRef idx="1">
+            <a:schemeClr val="accent1"/>
+          </a:lnRef>
+          <a:fillRef idx="0">
+            <a:schemeClr val="accent1"/>
+          </a:fillRef>
+          <a:effectRef idx="0">
+            <a:schemeClr val="accent1"/>
+          </a:effectRef>
+          <a:fontRef idx="minor">
+            <a:schemeClr val="tx1"/>
+          </a:fontRef>
+        </p:style>
+      </p:cxnSp>
+      <p:cxnSp>
+        <p:nvCxnSpPr>
+          <p:cNvPr id="19" name="Straight Connector 18"/>
+          <p:cNvCxnSpPr>
+            <a:stCxn id="8" idx="2"/>
+            <a:endCxn id="11" idx="0"/>
+          </p:cNvCxnSpPr>
+          <p:nvPr/>
+        </p:nvCxnSpPr>
+        <p:spPr>
+          <a:xfrm>
+            <a:off x="5137563" y="3091858"/>
+            <a:ext cx="0" cy="652145"/>
+          </a:xfrm>
+          <a:prstGeom prst="line">
+            <a:avLst/>
+          </a:prstGeom>
+          <a:ln>
+            <a:solidFill>
+              <a:schemeClr val="tx1"/>
+            </a:solidFill>
+          </a:ln>
+        </p:spPr>
+        <p:style>
+          <a:lnRef idx="1">
+            <a:schemeClr val="accent1"/>
+          </a:lnRef>
+          <a:fillRef idx="0">
+            <a:schemeClr val="accent1"/>
+          </a:fillRef>
+          <a:effectRef idx="0">
+            <a:schemeClr val="accent1"/>
+          </a:effectRef>
+          <a:fontRef idx="minor">
+            <a:schemeClr val="tx1"/>
+          </a:fontRef>
+        </p:style>
+      </p:cxnSp>
+      <p:cxnSp>
+        <p:nvCxnSpPr>
+          <p:cNvPr id="21" name="Straight Connector 20"/>
+          <p:cNvCxnSpPr>
+            <a:stCxn id="9" idx="6"/>
+            <a:endCxn id="8" idx="1"/>
+          </p:cNvCxnSpPr>
+          <p:nvPr/>
+        </p:nvCxnSpPr>
+        <p:spPr>
+          <a:xfrm>
+            <a:off x="4030187" y="2740051"/>
+            <a:ext cx="760023" cy="4454"/>
+          </a:xfrm>
+          <a:prstGeom prst="line">
+            <a:avLst/>
+          </a:prstGeom>
+          <a:ln>
+            <a:solidFill>
+              <a:schemeClr val="tx1"/>
+            </a:solidFill>
+          </a:ln>
+        </p:spPr>
+        <p:style>
+          <a:lnRef idx="1">
+            <a:schemeClr val="accent1"/>
+          </a:lnRef>
+          <a:fillRef idx="0">
+            <a:schemeClr val="accent1"/>
+          </a:fillRef>
+          <a:effectRef idx="0">
+            <a:schemeClr val="accent1"/>
+          </a:effectRef>
+          <a:fontRef idx="minor">
+            <a:schemeClr val="tx1"/>
+          </a:fontRef>
+        </p:style>
+      </p:cxnSp>
+      <p:cxnSp>
+        <p:nvCxnSpPr>
+          <p:cNvPr id="23" name="Straight Connector 22"/>
+          <p:cNvCxnSpPr>
+            <a:stCxn id="10" idx="7"/>
+          </p:cNvCxnSpPr>
+          <p:nvPr/>
+        </p:nvCxnSpPr>
+        <p:spPr>
+          <a:xfrm flipV="1">
+            <a:off x="3927146" y="3096310"/>
+            <a:ext cx="863065" cy="750734"/>
+          </a:xfrm>
+          <a:prstGeom prst="line">
+            <a:avLst/>
+          </a:prstGeom>
+          <a:ln>
+            <a:solidFill>
+              <a:schemeClr val="tx1"/>
+            </a:solidFill>
+          </a:ln>
+        </p:spPr>
+        <p:style>
+          <a:lnRef idx="1">
+            <a:schemeClr val="accent1"/>
+          </a:lnRef>
+          <a:fillRef idx="0">
+            <a:schemeClr val="accent1"/>
+          </a:fillRef>
+          <a:effectRef idx="0">
+            <a:schemeClr val="accent1"/>
+          </a:effectRef>
+          <a:fontRef idx="minor">
+            <a:schemeClr val="tx1"/>
+          </a:fontRef>
+        </p:style>
+      </p:cxnSp>
+      <p:sp>
+        <p:nvSpPr>
+          <p:cNvPr id="32" name="Rectangle 31"/>
+          <p:cNvSpPr/>
+          <p:nvPr/>
+        </p:nvSpPr>
+        <p:spPr>
+          <a:xfrm>
+            <a:off x="4442857" y="2015094"/>
+            <a:ext cx="1390897" cy="2850078"/>
+          </a:xfrm>
+          <a:prstGeom prst="rect">
+            <a:avLst/>
+          </a:prstGeom>
+          <a:noFill/>
+          <a:ln>
+            <a:solidFill>
+              <a:schemeClr val="tx1"/>
+            </a:solidFill>
+          </a:ln>
+        </p:spPr>
+        <p:style>
+          <a:lnRef idx="2">
+            <a:schemeClr val="accent1">
+              <a:shade val="50000"/>
+            </a:schemeClr>
+          </a:lnRef>
+          <a:fillRef idx="1">
+            <a:schemeClr val="accent1"/>
+          </a:fillRef>
+          <a:effectRef idx="0">
+            <a:schemeClr val="accent1"/>
+          </a:effectRef>
+          <a:fontRef idx="minor">
+            <a:schemeClr val="lt1"/>
+          </a:fontRef>
+        </p:style>
+        <p:txBody>
+          <a:bodyPr rot="0" spcFirstLastPara="0" vertOverflow="overflow" horzOverflow="overflow" vert="horz" wrap="square" lIns="68580" tIns="34290" rIns="68580" bIns="34290" numCol="1" spcCol="0" rtlCol="0" fromWordArt="0" anchor="ctr" anchorCtr="0" forceAA="0" compatLnSpc="1">
+            <a:prstTxWarp prst="textNoShape">
+              <a:avLst/>
+            </a:prstTxWarp>
+            <a:noAutofit/>
+          </a:bodyPr>
+          <a:lstStyle/>
+          <a:p>
+            <a:pPr algn="ctr"/>
+            <a:endParaRPr lang="en-US" sz="900" dirty="0">
+              <a:solidFill>
+                <a:schemeClr val="tx1"/>
+              </a:solidFill>
+            </a:endParaRPr>
+          </a:p>
+        </p:txBody>
+      </p:sp>
+    </p:spTree>
+    <p:extLst>
+      <p:ext uri="{BB962C8B-B14F-4D97-AF65-F5344CB8AC3E}">
+        <p14:creationId xmlns:p14="http://schemas.microsoft.com/office/powerpoint/2010/main" val="4150613392"/>
+      </p:ext>
+    </p:extLst>
+  </p:cSld>
+  <p:clrMapOvr>
+    <a:masterClrMapping/>
+  </p:clrMapOvr>
+</p:sld>
+</file>
+
+<file path=ppt/slides/slide6.xml><?xml version="1.0" encoding="utf-8"?>
+<p:sld xmlns:a="http://schemas.openxmlformats.org/drawingml/2006/main" xmlns:r="http://schemas.openxmlformats.org/officeDocument/2006/relationships" xmlns:p="http://schemas.openxmlformats.org/presentationml/2006/main">
+  <p:cSld>
+    <p:spTree>
+      <p:nvGrpSpPr>
+        <p:cNvPr id="1" name=""/>
+        <p:cNvGrpSpPr/>
+        <p:nvPr/>
+      </p:nvGrpSpPr>
+      <p:grpSpPr>
+        <a:xfrm>
+          <a:off x="0" y="0"/>
+          <a:ext cx="0" cy="0"/>
+          <a:chOff x="0" y="0"/>
+          <a:chExt cx="0" cy="0"/>
+        </a:xfrm>
+      </p:grpSpPr>
+      <p:sp>
+        <p:nvSpPr>
+          <p:cNvPr id="4" name="Oval 3"/>
+          <p:cNvSpPr/>
+          <p:nvPr/>
+        </p:nvSpPr>
+        <p:spPr>
+          <a:xfrm>
+            <a:off x="3326575" y="2379338"/>
+            <a:ext cx="703613" cy="703613"/>
+          </a:xfrm>
+          <a:prstGeom prst="ellipse">
+            <a:avLst/>
+          </a:prstGeom>
+          <a:solidFill>
+            <a:schemeClr val="bg1"/>
+          </a:solidFill>
+          <a:ln>
+            <a:solidFill>
+              <a:schemeClr val="tx1"/>
+            </a:solidFill>
+          </a:ln>
+        </p:spPr>
+        <p:style>
+          <a:lnRef idx="2">
+            <a:schemeClr val="accent1">
+              <a:shade val="50000"/>
+            </a:schemeClr>
+          </a:lnRef>
+          <a:fillRef idx="1">
+            <a:schemeClr val="accent1"/>
+          </a:fillRef>
+          <a:effectRef idx="0">
+            <a:schemeClr val="accent1"/>
+          </a:effectRef>
+          <a:fontRef idx="minor">
+            <a:schemeClr val="lt1"/>
+          </a:fontRef>
+        </p:style>
+        <p:txBody>
+          <a:bodyPr rot="0" spcFirstLastPara="0" vertOverflow="overflow" horzOverflow="overflow" vert="horz" wrap="square" lIns="68580" tIns="34290" rIns="68580" bIns="34290" numCol="1" spcCol="0" rtlCol="0" fromWordArt="0" anchor="ctr" anchorCtr="0" forceAA="0" compatLnSpc="1">
+            <a:prstTxWarp prst="textNoShape">
+              <a:avLst/>
+            </a:prstTxWarp>
+            <a:noAutofit/>
+          </a:bodyPr>
+          <a:lstStyle/>
+          <a:p>
+            <a:pPr algn="ctr"/>
+            <a:r>
+              <a:rPr lang="en-US" sz="900" dirty="0">
+                <a:solidFill>
+                  <a:schemeClr val="tx1"/>
+                </a:solidFill>
+              </a:rPr>
+              <a:t>Work plan</a:t>
+            </a:r>
+          </a:p>
+        </p:txBody>
+      </p:sp>
+      <p:sp>
+        <p:nvSpPr>
+          <p:cNvPr id="5" name="Rectangle 4"/>
+          <p:cNvSpPr/>
+          <p:nvPr/>
+        </p:nvSpPr>
+        <p:spPr>
+          <a:xfrm>
+            <a:off x="4692239" y="2998339"/>
+            <a:ext cx="694706" cy="694706"/>
+          </a:xfrm>
+          <a:prstGeom prst="rect">
+            <a:avLst/>
+          </a:prstGeom>
+          <a:solidFill>
+            <a:schemeClr val="bg1"/>
+          </a:solidFill>
+          <a:ln>
+            <a:solidFill>
+              <a:schemeClr val="tx1"/>
+            </a:solidFill>
+          </a:ln>
+        </p:spPr>
+        <p:style>
+          <a:lnRef idx="2">
+            <a:schemeClr val="accent1">
+              <a:shade val="50000"/>
+            </a:schemeClr>
+          </a:lnRef>
+          <a:fillRef idx="1">
+            <a:schemeClr val="accent1"/>
+          </a:fillRef>
+          <a:effectRef idx="0">
+            <a:schemeClr val="accent1"/>
+          </a:effectRef>
+          <a:fontRef idx="minor">
+            <a:schemeClr val="lt1"/>
+          </a:fontRef>
+        </p:style>
+        <p:txBody>
+          <a:bodyPr rot="0" spcFirstLastPara="0" vertOverflow="overflow" horzOverflow="overflow" vert="horz" wrap="square" lIns="68580" tIns="34290" rIns="68580" bIns="34290" numCol="1" spcCol="0" rtlCol="0" fromWordArt="0" anchor="ctr" anchorCtr="0" forceAA="0" compatLnSpc="1">
+            <a:prstTxWarp prst="textNoShape">
+              <a:avLst/>
+            </a:prstTxWarp>
+            <a:noAutofit/>
+          </a:bodyPr>
+          <a:lstStyle/>
+          <a:p>
+            <a:pPr algn="ctr"/>
+            <a:r>
+              <a:rPr lang="en-US" sz="900" dirty="0">
+                <a:solidFill>
+                  <a:schemeClr val="tx1"/>
+                </a:solidFill>
+              </a:rPr>
+              <a:t>Planning algorithm</a:t>
+            </a:r>
+          </a:p>
+        </p:txBody>
+      </p:sp>
+      <p:sp>
+        <p:nvSpPr>
+          <p:cNvPr id="6" name="Oval 5"/>
+          <p:cNvSpPr/>
+          <p:nvPr/>
+        </p:nvSpPr>
+        <p:spPr>
+          <a:xfrm>
+            <a:off x="3326575" y="3557964"/>
+            <a:ext cx="703613" cy="703613"/>
+          </a:xfrm>
+          <a:prstGeom prst="ellipse">
+            <a:avLst/>
+          </a:prstGeom>
+          <a:solidFill>
+            <a:schemeClr val="bg1"/>
+          </a:solidFill>
+          <a:ln>
+            <a:solidFill>
+              <a:schemeClr val="tx1"/>
+            </a:solidFill>
+          </a:ln>
+        </p:spPr>
+        <p:style>
+          <a:lnRef idx="2">
+            <a:schemeClr val="accent1">
+              <a:shade val="50000"/>
+            </a:schemeClr>
+          </a:lnRef>
+          <a:fillRef idx="1">
+            <a:schemeClr val="accent1"/>
+          </a:fillRef>
+          <a:effectRef idx="0">
+            <a:schemeClr val="accent1"/>
+          </a:effectRef>
+          <a:fontRef idx="minor">
+            <a:schemeClr val="lt1"/>
+          </a:fontRef>
+        </p:style>
+        <p:txBody>
+          <a:bodyPr rot="0" spcFirstLastPara="0" vertOverflow="overflow" horzOverflow="overflow" vert="horz" wrap="square" lIns="68580" tIns="34290" rIns="68580" bIns="34290" numCol="1" spcCol="0" rtlCol="0" fromWordArt="0" anchor="ctr" anchorCtr="0" forceAA="0" compatLnSpc="1">
+            <a:prstTxWarp prst="textNoShape">
+              <a:avLst/>
+            </a:prstTxWarp>
+            <a:noAutofit/>
+          </a:bodyPr>
+          <a:lstStyle/>
+          <a:p>
+            <a:pPr algn="ctr"/>
+            <a:r>
+              <a:rPr lang="en-US" sz="900" dirty="0">
+                <a:solidFill>
+                  <a:schemeClr val="tx1"/>
+                </a:solidFill>
+              </a:rPr>
+              <a:t>Input image</a:t>
+            </a:r>
+          </a:p>
+        </p:txBody>
+      </p:sp>
+      <p:cxnSp>
+        <p:nvCxnSpPr>
+          <p:cNvPr id="8" name="Straight Connector 7"/>
+          <p:cNvCxnSpPr>
+            <a:stCxn id="6" idx="6"/>
+          </p:cNvCxnSpPr>
+          <p:nvPr/>
+        </p:nvCxnSpPr>
+        <p:spPr>
+          <a:xfrm flipV="1">
+            <a:off x="4030187" y="3688592"/>
+            <a:ext cx="662052" cy="221179"/>
+          </a:xfrm>
+          <a:prstGeom prst="line">
+            <a:avLst/>
+          </a:prstGeom>
+          <a:ln>
+            <a:solidFill>
+              <a:schemeClr val="tx1"/>
+            </a:solidFill>
+          </a:ln>
+        </p:spPr>
+        <p:style>
+          <a:lnRef idx="1">
+            <a:schemeClr val="accent1"/>
+          </a:lnRef>
+          <a:fillRef idx="0">
+            <a:schemeClr val="accent1"/>
+          </a:fillRef>
+          <a:effectRef idx="0">
+            <a:schemeClr val="accent1"/>
+          </a:effectRef>
+          <a:fontRef idx="minor">
+            <a:schemeClr val="tx1"/>
+          </a:fontRef>
+        </p:style>
+      </p:cxnSp>
+      <p:cxnSp>
+        <p:nvCxnSpPr>
+          <p:cNvPr id="10" name="Straight Connector 9"/>
+          <p:cNvCxnSpPr>
+            <a:endCxn id="4" idx="6"/>
+          </p:cNvCxnSpPr>
+          <p:nvPr/>
+        </p:nvCxnSpPr>
+        <p:spPr>
+          <a:xfrm flipH="1" flipV="1">
+            <a:off x="4030187" y="2731145"/>
+            <a:ext cx="662052" cy="253835"/>
+          </a:xfrm>
+          <a:prstGeom prst="line">
+            <a:avLst/>
+          </a:prstGeom>
+          <a:ln>
+            <a:solidFill>
+              <a:schemeClr val="tx1"/>
+            </a:solidFill>
+          </a:ln>
+        </p:spPr>
+        <p:style>
+          <a:lnRef idx="1">
+            <a:schemeClr val="accent1"/>
+          </a:lnRef>
+          <a:fillRef idx="0">
+            <a:schemeClr val="accent1"/>
+          </a:fillRef>
+          <a:effectRef idx="0">
+            <a:schemeClr val="accent1"/>
+          </a:effectRef>
+          <a:fontRef idx="minor">
+            <a:schemeClr val="tx1"/>
+          </a:fontRef>
+        </p:style>
+      </p:cxnSp>
+      <p:sp>
+        <p:nvSpPr>
+          <p:cNvPr id="11" name="Rectangle 10"/>
+          <p:cNvSpPr/>
+          <p:nvPr/>
+        </p:nvSpPr>
+        <p:spPr>
+          <a:xfrm>
+            <a:off x="4344144" y="1920653"/>
+            <a:ext cx="1390897" cy="2850078"/>
+          </a:xfrm>
+          <a:prstGeom prst="rect">
+            <a:avLst/>
+          </a:prstGeom>
+          <a:noFill/>
+          <a:ln>
+            <a:solidFill>
+              <a:schemeClr val="tx1"/>
+            </a:solidFill>
+          </a:ln>
+        </p:spPr>
+        <p:style>
+          <a:lnRef idx="2">
+            <a:schemeClr val="accent1">
+              <a:shade val="50000"/>
+            </a:schemeClr>
+          </a:lnRef>
+          <a:fillRef idx="1">
+            <a:schemeClr val="accent1"/>
+          </a:fillRef>
+          <a:effectRef idx="0">
+            <a:schemeClr val="accent1"/>
+          </a:effectRef>
+          <a:fontRef idx="minor">
+            <a:schemeClr val="lt1"/>
+          </a:fontRef>
+        </p:style>
+        <p:txBody>
+          <a:bodyPr rot="0" spcFirstLastPara="0" vertOverflow="overflow" horzOverflow="overflow" vert="horz" wrap="square" lIns="68580" tIns="34290" rIns="68580" bIns="34290" numCol="1" spcCol="0" rtlCol="0" fromWordArt="0" anchor="ctr" anchorCtr="0" forceAA="0" compatLnSpc="1">
+            <a:prstTxWarp prst="textNoShape">
+              <a:avLst/>
+            </a:prstTxWarp>
+            <a:noAutofit/>
+          </a:bodyPr>
+          <a:lstStyle/>
+          <a:p>
+            <a:pPr algn="ctr"/>
+            <a:endParaRPr lang="en-US" sz="900" dirty="0">
+              <a:solidFill>
+                <a:schemeClr val="tx1"/>
+              </a:solidFill>
+            </a:endParaRPr>
+          </a:p>
+        </p:txBody>
+      </p:sp>
+    </p:spTree>
+    <p:extLst>
+      <p:ext uri="{BB962C8B-B14F-4D97-AF65-F5344CB8AC3E}">
+        <p14:creationId xmlns:p14="http://schemas.microsoft.com/office/powerpoint/2010/main" val="1623540643"/>
+      </p:ext>
+    </p:extLst>
+  </p:cSld>
+  <p:clrMapOvr>
+    <a:masterClrMapping/>
+  </p:clrMapOvr>
+</p:sld>
+</file>
+
+<file path=ppt/slides/slide7.xml><?xml version="1.0" encoding="utf-8"?>
+<p:sld xmlns:a="http://schemas.openxmlformats.org/drawingml/2006/main" xmlns:r="http://schemas.openxmlformats.org/officeDocument/2006/relationships" xmlns:p="http://schemas.openxmlformats.org/presentationml/2006/main">
+  <p:cSld>
+    <p:spTree>
+      <p:nvGrpSpPr>
+        <p:cNvPr id="1" name=""/>
+        <p:cNvGrpSpPr/>
+        <p:nvPr/>
+      </p:nvGrpSpPr>
+      <p:grpSpPr>
+        <a:xfrm>
+          <a:off x="0" y="0"/>
+          <a:ext cx="0" cy="0"/>
+          <a:chOff x="0" y="0"/>
+          <a:chExt cx="0" cy="0"/>
+        </a:xfrm>
+      </p:grpSpPr>
+      <p:sp>
+        <p:nvSpPr>
+          <p:cNvPr id="4" name="Oval 3"/>
+          <p:cNvSpPr/>
+          <p:nvPr/>
+        </p:nvSpPr>
+        <p:spPr>
+          <a:xfrm>
+            <a:off x="3326575" y="2379338"/>
+            <a:ext cx="703613" cy="703613"/>
+          </a:xfrm>
+          <a:prstGeom prst="ellipse">
+            <a:avLst/>
+          </a:prstGeom>
+          <a:solidFill>
+            <a:schemeClr val="bg1"/>
+          </a:solidFill>
+          <a:ln>
+            <a:solidFill>
+              <a:schemeClr val="tx1"/>
+            </a:solidFill>
+          </a:ln>
+        </p:spPr>
+        <p:style>
+          <a:lnRef idx="2">
+            <a:schemeClr val="accent1">
+              <a:shade val="50000"/>
+            </a:schemeClr>
+          </a:lnRef>
+          <a:fillRef idx="1">
+            <a:schemeClr val="accent1"/>
+          </a:fillRef>
+          <a:effectRef idx="0">
+            <a:schemeClr val="accent1"/>
+          </a:effectRef>
+          <a:fontRef idx="minor">
+            <a:schemeClr val="lt1"/>
+          </a:fontRef>
+        </p:style>
+        <p:txBody>
+          <a:bodyPr rot="0" spcFirstLastPara="0" vertOverflow="overflow" horzOverflow="overflow" vert="horz" wrap="square" lIns="68580" tIns="34290" rIns="68580" bIns="34290" numCol="1" spcCol="0" rtlCol="0" fromWordArt="0" anchor="ctr" anchorCtr="0" forceAA="0" compatLnSpc="1">
+            <a:prstTxWarp prst="textNoShape">
+              <a:avLst/>
+            </a:prstTxWarp>
+            <a:noAutofit/>
+          </a:bodyPr>
+          <a:lstStyle/>
+          <a:p>
+            <a:pPr algn="ctr"/>
+            <a:r>
+              <a:rPr lang="en-US" sz="900" dirty="0">
+                <a:solidFill>
+                  <a:schemeClr val="tx1"/>
+                </a:solidFill>
+              </a:rPr>
+              <a:t>Motor control module</a:t>
+            </a:r>
+          </a:p>
+        </p:txBody>
+      </p:sp>
+      <p:sp>
+        <p:nvSpPr>
+          <p:cNvPr id="5" name="Rectangle 4"/>
+          <p:cNvSpPr/>
+          <p:nvPr/>
+        </p:nvSpPr>
+        <p:spPr>
+          <a:xfrm>
+            <a:off x="4692238" y="3838519"/>
+            <a:ext cx="694706" cy="694706"/>
+          </a:xfrm>
+          <a:prstGeom prst="rect">
+            <a:avLst/>
+          </a:prstGeom>
+          <a:solidFill>
+            <a:schemeClr val="bg1"/>
+          </a:solidFill>
+          <a:ln>
+            <a:solidFill>
+              <a:schemeClr val="tx1"/>
+            </a:solidFill>
+          </a:ln>
+        </p:spPr>
+        <p:style>
+          <a:lnRef idx="2">
+            <a:schemeClr val="accent1">
+              <a:shade val="50000"/>
+            </a:schemeClr>
+          </a:lnRef>
+          <a:fillRef idx="1">
+            <a:schemeClr val="accent1"/>
+          </a:fillRef>
+          <a:effectRef idx="0">
+            <a:schemeClr val="accent1"/>
+          </a:effectRef>
+          <a:fontRef idx="minor">
+            <a:schemeClr val="lt1"/>
+          </a:fontRef>
+        </p:style>
+        <p:txBody>
+          <a:bodyPr rot="0" spcFirstLastPara="0" vertOverflow="overflow" horzOverflow="overflow" vert="horz" wrap="square" lIns="68580" tIns="34290" rIns="68580" bIns="34290" numCol="1" spcCol="0" rtlCol="0" fromWordArt="0" anchor="ctr" anchorCtr="0" forceAA="0" compatLnSpc="1">
+            <a:prstTxWarp prst="textNoShape">
+              <a:avLst/>
+            </a:prstTxWarp>
+            <a:noAutofit/>
+          </a:bodyPr>
+          <a:lstStyle/>
+          <a:p>
+            <a:pPr algn="ctr"/>
+            <a:r>
+              <a:rPr lang="en-US" sz="900" dirty="0">
+                <a:solidFill>
+                  <a:schemeClr val="tx1"/>
+                </a:solidFill>
+              </a:rPr>
+              <a:t>Working schedule</a:t>
+            </a:r>
+          </a:p>
+        </p:txBody>
+      </p:sp>
+      <p:sp>
+        <p:nvSpPr>
+          <p:cNvPr id="6" name="Oval 5"/>
+          <p:cNvSpPr/>
+          <p:nvPr/>
+        </p:nvSpPr>
+        <p:spPr>
+          <a:xfrm>
+            <a:off x="3326575" y="3557964"/>
+            <a:ext cx="703613" cy="703613"/>
+          </a:xfrm>
+          <a:prstGeom prst="ellipse">
+            <a:avLst/>
+          </a:prstGeom>
+          <a:solidFill>
+            <a:schemeClr val="bg1"/>
+          </a:solidFill>
+          <a:ln>
+            <a:solidFill>
+              <a:schemeClr val="tx1"/>
+            </a:solidFill>
+          </a:ln>
+        </p:spPr>
+        <p:style>
+          <a:lnRef idx="2">
+            <a:schemeClr val="accent1">
+              <a:shade val="50000"/>
+            </a:schemeClr>
+          </a:lnRef>
+          <a:fillRef idx="1">
+            <a:schemeClr val="accent1"/>
+          </a:fillRef>
+          <a:effectRef idx="0">
+            <a:schemeClr val="accent1"/>
+          </a:effectRef>
+          <a:fontRef idx="minor">
+            <a:schemeClr val="lt1"/>
+          </a:fontRef>
+        </p:style>
+        <p:txBody>
+          <a:bodyPr rot="0" spcFirstLastPara="0" vertOverflow="overflow" horzOverflow="overflow" vert="horz" wrap="square" lIns="68580" tIns="34290" rIns="68580" bIns="34290" numCol="1" spcCol="0" rtlCol="0" fromWordArt="0" anchor="ctr" anchorCtr="0" forceAA="0" compatLnSpc="1">
+            <a:prstTxWarp prst="textNoShape">
+              <a:avLst/>
+            </a:prstTxWarp>
+            <a:noAutofit/>
+          </a:bodyPr>
+          <a:lstStyle/>
+          <a:p>
+            <a:pPr algn="ctr"/>
+            <a:r>
+              <a:rPr lang="en-US" sz="900" dirty="0" err="1">
+                <a:solidFill>
+                  <a:schemeClr val="tx1"/>
+                </a:solidFill>
+              </a:rPr>
+              <a:t>Locali-zation</a:t>
+            </a:r>
+            <a:r>
+              <a:rPr lang="en-US" sz="900" dirty="0">
+                <a:solidFill>
+                  <a:schemeClr val="tx1"/>
+                </a:solidFill>
+              </a:rPr>
+              <a:t> module</a:t>
+            </a:r>
+          </a:p>
+        </p:txBody>
+      </p:sp>
+      <p:cxnSp>
+        <p:nvCxnSpPr>
+          <p:cNvPr id="7" name="Straight Connector 6"/>
+          <p:cNvCxnSpPr>
+            <a:stCxn id="6" idx="6"/>
+            <a:endCxn id="5" idx="1"/>
+          </p:cNvCxnSpPr>
+          <p:nvPr/>
+        </p:nvCxnSpPr>
+        <p:spPr>
+          <a:xfrm>
+            <a:off x="4030188" y="3909771"/>
+            <a:ext cx="662051" cy="276101"/>
+          </a:xfrm>
+          <a:prstGeom prst="line">
+            <a:avLst/>
+          </a:prstGeom>
+          <a:ln>
+            <a:solidFill>
+              <a:schemeClr val="tx1"/>
+            </a:solidFill>
+          </a:ln>
+        </p:spPr>
+        <p:style>
+          <a:lnRef idx="1">
+            <a:schemeClr val="accent1"/>
+          </a:lnRef>
+          <a:fillRef idx="0">
+            <a:schemeClr val="accent1"/>
+          </a:fillRef>
+          <a:effectRef idx="0">
+            <a:schemeClr val="accent1"/>
+          </a:effectRef>
+          <a:fontRef idx="minor">
+            <a:schemeClr val="tx1"/>
+          </a:fontRef>
+        </p:style>
+      </p:cxnSp>
+      <p:cxnSp>
+        <p:nvCxnSpPr>
+          <p:cNvPr id="8" name="Straight Connector 7"/>
+          <p:cNvCxnSpPr>
+            <a:stCxn id="16" idx="1"/>
+            <a:endCxn id="4" idx="6"/>
+          </p:cNvCxnSpPr>
+          <p:nvPr/>
+        </p:nvCxnSpPr>
+        <p:spPr>
+          <a:xfrm flipH="1">
+            <a:off x="4030188" y="2529266"/>
+            <a:ext cx="662051" cy="201879"/>
+          </a:xfrm>
+          <a:prstGeom prst="line">
+            <a:avLst/>
+          </a:prstGeom>
+          <a:ln>
+            <a:solidFill>
+              <a:schemeClr val="tx1"/>
+            </a:solidFill>
+          </a:ln>
+        </p:spPr>
+        <p:style>
+          <a:lnRef idx="1">
+            <a:schemeClr val="accent1"/>
+          </a:lnRef>
+          <a:fillRef idx="0">
+            <a:schemeClr val="accent1"/>
+          </a:fillRef>
+          <a:effectRef idx="0">
+            <a:schemeClr val="accent1"/>
+          </a:effectRef>
+          <a:fontRef idx="minor">
+            <a:schemeClr val="tx1"/>
+          </a:fontRef>
+        </p:style>
+      </p:cxnSp>
+      <p:sp>
+        <p:nvSpPr>
+          <p:cNvPr id="9" name="Rectangle 8"/>
+          <p:cNvSpPr/>
+          <p:nvPr/>
+        </p:nvSpPr>
+        <p:spPr>
+          <a:xfrm>
+            <a:off x="4344144" y="1920653"/>
+            <a:ext cx="1390897" cy="2850078"/>
+          </a:xfrm>
+          <a:prstGeom prst="rect">
+            <a:avLst/>
+          </a:prstGeom>
+          <a:noFill/>
+          <a:ln>
+            <a:solidFill>
+              <a:schemeClr val="tx1"/>
+            </a:solidFill>
+          </a:ln>
+        </p:spPr>
+        <p:style>
+          <a:lnRef idx="2">
+            <a:schemeClr val="accent1">
+              <a:shade val="50000"/>
+            </a:schemeClr>
+          </a:lnRef>
+          <a:fillRef idx="1">
+            <a:schemeClr val="accent1"/>
+          </a:fillRef>
+          <a:effectRef idx="0">
+            <a:schemeClr val="accent1"/>
+          </a:effectRef>
+          <a:fontRef idx="minor">
+            <a:schemeClr val="lt1"/>
+          </a:fontRef>
+        </p:style>
+        <p:txBody>
+          <a:bodyPr rot="0" spcFirstLastPara="0" vertOverflow="overflow" horzOverflow="overflow" vert="horz" wrap="square" lIns="68580" tIns="34290" rIns="68580" bIns="34290" numCol="1" spcCol="0" rtlCol="0" fromWordArt="0" anchor="ctr" anchorCtr="0" forceAA="0" compatLnSpc="1">
+            <a:prstTxWarp prst="textNoShape">
+              <a:avLst/>
+            </a:prstTxWarp>
+            <a:noAutofit/>
+          </a:bodyPr>
+          <a:lstStyle/>
+          <a:p>
+            <a:pPr algn="ctr"/>
+            <a:endParaRPr lang="en-US" sz="900" dirty="0">
+              <a:solidFill>
+                <a:schemeClr val="tx1"/>
+              </a:solidFill>
+            </a:endParaRPr>
+          </a:p>
+        </p:txBody>
+      </p:sp>
+      <p:sp>
+        <p:nvSpPr>
+          <p:cNvPr id="14" name="Rectangle 13"/>
+          <p:cNvSpPr/>
+          <p:nvPr/>
+        </p:nvSpPr>
+        <p:spPr>
+          <a:xfrm>
+            <a:off x="4692238" y="3008732"/>
+            <a:ext cx="694706" cy="694706"/>
+          </a:xfrm>
+          <a:prstGeom prst="rect">
+            <a:avLst/>
+          </a:prstGeom>
+          <a:solidFill>
+            <a:schemeClr val="bg1"/>
+          </a:solidFill>
+          <a:ln>
+            <a:solidFill>
+              <a:schemeClr val="tx1"/>
+            </a:solidFill>
+          </a:ln>
+        </p:spPr>
+        <p:style>
+          <a:lnRef idx="2">
+            <a:schemeClr val="accent1">
+              <a:shade val="50000"/>
+            </a:schemeClr>
+          </a:lnRef>
+          <a:fillRef idx="1">
+            <a:schemeClr val="accent1"/>
+          </a:fillRef>
+          <a:effectRef idx="0">
+            <a:schemeClr val="accent1"/>
+          </a:effectRef>
+          <a:fontRef idx="minor">
+            <a:schemeClr val="lt1"/>
+          </a:fontRef>
+        </p:style>
+        <p:txBody>
+          <a:bodyPr rot="0" spcFirstLastPara="0" vertOverflow="overflow" horzOverflow="overflow" vert="horz" wrap="square" lIns="68580" tIns="34290" rIns="68580" bIns="34290" numCol="1" spcCol="0" rtlCol="0" fromWordArt="0" anchor="ctr" anchorCtr="0" forceAA="0" compatLnSpc="1">
+            <a:prstTxWarp prst="textNoShape">
+              <a:avLst/>
+            </a:prstTxWarp>
+            <a:noAutofit/>
+          </a:bodyPr>
+          <a:lstStyle/>
+          <a:p>
+            <a:pPr algn="ctr"/>
+            <a:r>
+              <a:rPr lang="en-US" sz="900" dirty="0">
+                <a:solidFill>
+                  <a:schemeClr val="tx1"/>
+                </a:solidFill>
+              </a:rPr>
+              <a:t>Area map</a:t>
+            </a:r>
+          </a:p>
+        </p:txBody>
+      </p:sp>
+      <p:sp>
+        <p:nvSpPr>
+          <p:cNvPr id="16" name="Rectangle 15"/>
+          <p:cNvSpPr/>
+          <p:nvPr/>
+        </p:nvSpPr>
+        <p:spPr>
+          <a:xfrm>
+            <a:off x="4692238" y="2181913"/>
+            <a:ext cx="694706" cy="694706"/>
+          </a:xfrm>
+          <a:prstGeom prst="rect">
+            <a:avLst/>
+          </a:prstGeom>
+          <a:solidFill>
+            <a:schemeClr val="bg1"/>
+          </a:solidFill>
+          <a:ln>
+            <a:solidFill>
+              <a:schemeClr val="tx1"/>
+            </a:solidFill>
+          </a:ln>
+        </p:spPr>
+        <p:style>
+          <a:lnRef idx="2">
+            <a:schemeClr val="accent1">
+              <a:shade val="50000"/>
+            </a:schemeClr>
+          </a:lnRef>
+          <a:fillRef idx="1">
+            <a:schemeClr val="accent1"/>
+          </a:fillRef>
+          <a:effectRef idx="0">
+            <a:schemeClr val="accent1"/>
+          </a:effectRef>
+          <a:fontRef idx="minor">
+            <a:schemeClr val="lt1"/>
+          </a:fontRef>
+        </p:style>
+        <p:txBody>
+          <a:bodyPr rot="0" spcFirstLastPara="0" vertOverflow="overflow" horzOverflow="overflow" vert="horz" wrap="square" lIns="68580" tIns="34290" rIns="68580" bIns="34290" numCol="1" spcCol="0" rtlCol="0" fromWordArt="0" anchor="ctr" anchorCtr="0" forceAA="0" compatLnSpc="1">
+            <a:prstTxWarp prst="textNoShape">
+              <a:avLst/>
+            </a:prstTxWarp>
+            <a:noAutofit/>
+          </a:bodyPr>
+          <a:lstStyle/>
+          <a:p>
+            <a:pPr algn="ctr"/>
+            <a:r>
+              <a:rPr lang="en-US" sz="900" dirty="0">
+                <a:solidFill>
+                  <a:schemeClr val="tx1"/>
+                </a:solidFill>
+              </a:rPr>
+              <a:t>Path planning module</a:t>
+            </a:r>
+          </a:p>
+        </p:txBody>
+      </p:sp>
+      <p:cxnSp>
+        <p:nvCxnSpPr>
+          <p:cNvPr id="21" name="Straight Connector 20"/>
+          <p:cNvCxnSpPr>
+            <a:stCxn id="5" idx="0"/>
+            <a:endCxn id="14" idx="2"/>
+          </p:cNvCxnSpPr>
+          <p:nvPr/>
+        </p:nvCxnSpPr>
+        <p:spPr>
+          <a:xfrm flipV="1">
+            <a:off x="5039591" y="3703438"/>
+            <a:ext cx="0" cy="135081"/>
+          </a:xfrm>
+          <a:prstGeom prst="line">
+            <a:avLst/>
+          </a:prstGeom>
+          <a:ln>
+            <a:solidFill>
+              <a:schemeClr val="tx1"/>
+            </a:solidFill>
+          </a:ln>
+        </p:spPr>
+        <p:style>
+          <a:lnRef idx="1">
+            <a:schemeClr val="accent1"/>
+          </a:lnRef>
+          <a:fillRef idx="0">
+            <a:schemeClr val="accent1"/>
+          </a:fillRef>
+          <a:effectRef idx="0">
+            <a:schemeClr val="accent1"/>
+          </a:effectRef>
+          <a:fontRef idx="minor">
+            <a:schemeClr val="tx1"/>
+          </a:fontRef>
+        </p:style>
+      </p:cxnSp>
+      <p:cxnSp>
+        <p:nvCxnSpPr>
+          <p:cNvPr id="23" name="Straight Connector 22"/>
+          <p:cNvCxnSpPr>
+            <a:stCxn id="14" idx="0"/>
+            <a:endCxn id="16" idx="2"/>
+          </p:cNvCxnSpPr>
+          <p:nvPr/>
+        </p:nvCxnSpPr>
+        <p:spPr>
+          <a:xfrm flipV="1">
+            <a:off x="5039591" y="2876618"/>
+            <a:ext cx="0" cy="132114"/>
+          </a:xfrm>
+          <a:prstGeom prst="line">
+            <a:avLst/>
+          </a:prstGeom>
+          <a:ln>
+            <a:solidFill>
+              <a:schemeClr val="tx1"/>
+            </a:solidFill>
+          </a:ln>
+        </p:spPr>
+        <p:style>
+          <a:lnRef idx="1">
+            <a:schemeClr val="accent1"/>
+          </a:lnRef>
+          <a:fillRef idx="0">
+            <a:schemeClr val="accent1"/>
+          </a:fillRef>
+          <a:effectRef idx="0">
+            <a:schemeClr val="accent1"/>
+          </a:effectRef>
+          <a:fontRef idx="minor">
+            <a:schemeClr val="tx1"/>
+          </a:fontRef>
+        </p:style>
+      </p:cxnSp>
+    </p:spTree>
+    <p:extLst>
+      <p:ext uri="{BB962C8B-B14F-4D97-AF65-F5344CB8AC3E}">
+        <p14:creationId xmlns:p14="http://schemas.microsoft.com/office/powerpoint/2010/main" val="2397326149"/>
       </p:ext>
     </p:extLst>
   </p:cSld>

</xml_diff>

<commit_message>
added big use cases diagram
</commit_message>
<xml_diff>
--- a/requirements/examples/model_template.pptx
+++ b/requirements/examples/model_template.pptx
@@ -12,6 +12,7 @@
     <p:sldId id="260" r:id="rId6"/>
     <p:sldId id="261" r:id="rId7"/>
     <p:sldId id="262" r:id="rId8"/>
+    <p:sldId id="263" r:id="rId9"/>
   </p:sldIdLst>
   <p:sldSz cx="9144000" cy="6858000" type="screen4x3"/>
   <p:notesSz cx="6858000" cy="9144000"/>
@@ -308,7 +309,7 @@
           <a:p>
             <a:fld id="{804314D7-31D5-6545-8E8B-E4EAE547D6F9}" type="datetimeFigureOut">
               <a:rPr lang="en-US" smtClean="0"/>
-              <a:t>10/6/2016</a:t>
+              <a:t>10/16/2016</a:t>
             </a:fld>
             <a:endParaRPr lang="en-US"/>
           </a:p>
@@ -476,7 +477,7 @@
           <a:p>
             <a:fld id="{804314D7-31D5-6545-8E8B-E4EAE547D6F9}" type="datetimeFigureOut">
               <a:rPr lang="en-US" smtClean="0"/>
-              <a:t>10/6/2016</a:t>
+              <a:t>10/16/2016</a:t>
             </a:fld>
             <a:endParaRPr lang="en-US"/>
           </a:p>
@@ -654,7 +655,7 @@
           <a:p>
             <a:fld id="{804314D7-31D5-6545-8E8B-E4EAE547D6F9}" type="datetimeFigureOut">
               <a:rPr lang="en-US" smtClean="0"/>
-              <a:t>10/6/2016</a:t>
+              <a:t>10/16/2016</a:t>
             </a:fld>
             <a:endParaRPr lang="en-US"/>
           </a:p>
@@ -822,7 +823,7 @@
           <a:p>
             <a:fld id="{804314D7-31D5-6545-8E8B-E4EAE547D6F9}" type="datetimeFigureOut">
               <a:rPr lang="en-US" smtClean="0"/>
-              <a:t>10/6/2016</a:t>
+              <a:t>10/16/2016</a:t>
             </a:fld>
             <a:endParaRPr lang="en-US"/>
           </a:p>
@@ -1067,7 +1068,7 @@
           <a:p>
             <a:fld id="{804314D7-31D5-6545-8E8B-E4EAE547D6F9}" type="datetimeFigureOut">
               <a:rPr lang="en-US" smtClean="0"/>
-              <a:t>10/6/2016</a:t>
+              <a:t>10/16/2016</a:t>
             </a:fld>
             <a:endParaRPr lang="en-US"/>
           </a:p>
@@ -1352,7 +1353,7 @@
           <a:p>
             <a:fld id="{804314D7-31D5-6545-8E8B-E4EAE547D6F9}" type="datetimeFigureOut">
               <a:rPr lang="en-US" smtClean="0"/>
-              <a:t>10/6/2016</a:t>
+              <a:t>10/16/2016</a:t>
             </a:fld>
             <a:endParaRPr lang="en-US"/>
           </a:p>
@@ -1771,7 +1772,7 @@
           <a:p>
             <a:fld id="{804314D7-31D5-6545-8E8B-E4EAE547D6F9}" type="datetimeFigureOut">
               <a:rPr lang="en-US" smtClean="0"/>
-              <a:t>10/6/2016</a:t>
+              <a:t>10/16/2016</a:t>
             </a:fld>
             <a:endParaRPr lang="en-US"/>
           </a:p>
@@ -1888,7 +1889,7 @@
           <a:p>
             <a:fld id="{804314D7-31D5-6545-8E8B-E4EAE547D6F9}" type="datetimeFigureOut">
               <a:rPr lang="en-US" smtClean="0"/>
-              <a:t>10/6/2016</a:t>
+              <a:t>10/16/2016</a:t>
             </a:fld>
             <a:endParaRPr lang="en-US"/>
           </a:p>
@@ -1983,7 +1984,7 @@
           <a:p>
             <a:fld id="{804314D7-31D5-6545-8E8B-E4EAE547D6F9}" type="datetimeFigureOut">
               <a:rPr lang="en-US" smtClean="0"/>
-              <a:t>10/6/2016</a:t>
+              <a:t>10/16/2016</a:t>
             </a:fld>
             <a:endParaRPr lang="en-US"/>
           </a:p>
@@ -2258,7 +2259,7 @@
           <a:p>
             <a:fld id="{804314D7-31D5-6545-8E8B-E4EAE547D6F9}" type="datetimeFigureOut">
               <a:rPr lang="en-US" smtClean="0"/>
-              <a:t>10/6/2016</a:t>
+              <a:t>10/16/2016</a:t>
             </a:fld>
             <a:endParaRPr lang="en-US"/>
           </a:p>
@@ -2510,7 +2511,7 @@
           <a:p>
             <a:fld id="{804314D7-31D5-6545-8E8B-E4EAE547D6F9}" type="datetimeFigureOut">
               <a:rPr lang="en-US" smtClean="0"/>
-              <a:t>10/6/2016</a:t>
+              <a:t>10/16/2016</a:t>
             </a:fld>
             <a:endParaRPr lang="en-US"/>
           </a:p>
@@ -2721,7 +2722,7 @@
           <a:p>
             <a:fld id="{804314D7-31D5-6545-8E8B-E4EAE547D6F9}" type="datetimeFigureOut">
               <a:rPr lang="en-US" smtClean="0"/>
-              <a:t>10/6/2016</a:t>
+              <a:t>10/16/2016</a:t>
             </a:fld>
             <a:endParaRPr lang="en-US"/>
           </a:p>
@@ -6361,6 +6362,1102 @@
     <p:extLst>
       <p:ext uri="{BB962C8B-B14F-4D97-AF65-F5344CB8AC3E}">
         <p14:creationId xmlns:p14="http://schemas.microsoft.com/office/powerpoint/2010/main" val="2397326149"/>
+      </p:ext>
+    </p:extLst>
+  </p:cSld>
+  <p:clrMapOvr>
+    <a:masterClrMapping/>
+  </p:clrMapOvr>
+</p:sld>
+</file>
+
+<file path=ppt/slides/slide8.xml><?xml version="1.0" encoding="utf-8"?>
+<p:sld xmlns:a="http://schemas.openxmlformats.org/drawingml/2006/main" xmlns:r="http://schemas.openxmlformats.org/officeDocument/2006/relationships" xmlns:p="http://schemas.openxmlformats.org/presentationml/2006/main">
+  <p:cSld>
+    <p:spTree>
+      <p:nvGrpSpPr>
+        <p:cNvPr id="1" name=""/>
+        <p:cNvGrpSpPr/>
+        <p:nvPr/>
+      </p:nvGrpSpPr>
+      <p:grpSpPr>
+        <a:xfrm>
+          <a:off x="0" y="0"/>
+          <a:ext cx="0" cy="0"/>
+          <a:chOff x="0" y="0"/>
+          <a:chExt cx="0" cy="0"/>
+        </a:xfrm>
+      </p:grpSpPr>
+      <p:sp>
+        <p:nvSpPr>
+          <p:cNvPr id="6" name="Rectangle 5"/>
+          <p:cNvSpPr/>
+          <p:nvPr/>
+        </p:nvSpPr>
+        <p:spPr>
+          <a:xfrm>
+            <a:off x="3883937" y="897648"/>
+            <a:ext cx="3404103" cy="5702327"/>
+          </a:xfrm>
+          <a:prstGeom prst="rect">
+            <a:avLst/>
+          </a:prstGeom>
+          <a:noFill/>
+          <a:ln>
+            <a:solidFill>
+              <a:schemeClr val="tx1"/>
+            </a:solidFill>
+          </a:ln>
+        </p:spPr>
+        <p:style>
+          <a:lnRef idx="2">
+            <a:schemeClr val="accent1">
+              <a:shade val="50000"/>
+            </a:schemeClr>
+          </a:lnRef>
+          <a:fillRef idx="1">
+            <a:schemeClr val="accent1"/>
+          </a:fillRef>
+          <a:effectRef idx="0">
+            <a:schemeClr val="accent1"/>
+          </a:effectRef>
+          <a:fontRef idx="minor">
+            <a:schemeClr val="lt1"/>
+          </a:fontRef>
+        </p:style>
+        <p:txBody>
+          <a:bodyPr rot="0" spcFirstLastPara="0" vertOverflow="overflow" horzOverflow="overflow" vert="horz" wrap="square" lIns="68580" tIns="34290" rIns="68580" bIns="34290" numCol="1" spcCol="0" rtlCol="0" fromWordArt="0" anchor="ctr" anchorCtr="0" forceAA="0" compatLnSpc="1">
+            <a:prstTxWarp prst="textNoShape">
+              <a:avLst/>
+            </a:prstTxWarp>
+            <a:noAutofit/>
+          </a:bodyPr>
+          <a:lstStyle/>
+          <a:p>
+            <a:pPr algn="ctr"/>
+            <a:endParaRPr lang="en-US" sz="900" dirty="0">
+              <a:solidFill>
+                <a:schemeClr val="tx1"/>
+              </a:solidFill>
+            </a:endParaRPr>
+          </a:p>
+        </p:txBody>
+      </p:sp>
+      <p:sp>
+        <p:nvSpPr>
+          <p:cNvPr id="7" name="Rectangle 6"/>
+          <p:cNvSpPr/>
+          <p:nvPr/>
+        </p:nvSpPr>
+        <p:spPr>
+          <a:xfrm>
+            <a:off x="4537061" y="2011757"/>
+            <a:ext cx="768270" cy="768270"/>
+          </a:xfrm>
+          <a:prstGeom prst="rect">
+            <a:avLst/>
+          </a:prstGeom>
+          <a:solidFill>
+            <a:schemeClr val="bg1"/>
+          </a:solidFill>
+          <a:ln>
+            <a:solidFill>
+              <a:schemeClr val="tx1"/>
+            </a:solidFill>
+          </a:ln>
+        </p:spPr>
+        <p:style>
+          <a:lnRef idx="2">
+            <a:schemeClr val="accent1">
+              <a:shade val="50000"/>
+            </a:schemeClr>
+          </a:lnRef>
+          <a:fillRef idx="1">
+            <a:schemeClr val="accent1"/>
+          </a:fillRef>
+          <a:effectRef idx="0">
+            <a:schemeClr val="accent1"/>
+          </a:effectRef>
+          <a:fontRef idx="minor">
+            <a:schemeClr val="lt1"/>
+          </a:fontRef>
+        </p:style>
+        <p:txBody>
+          <a:bodyPr rot="0" spcFirstLastPara="0" vertOverflow="overflow" horzOverflow="overflow" vert="horz" wrap="square" lIns="68580" tIns="34290" rIns="68580" bIns="34290" numCol="1" spcCol="0" rtlCol="0" fromWordArt="0" anchor="ctr" anchorCtr="0" forceAA="0" compatLnSpc="1">
+            <a:prstTxWarp prst="textNoShape">
+              <a:avLst/>
+            </a:prstTxWarp>
+            <a:noAutofit/>
+          </a:bodyPr>
+          <a:lstStyle/>
+          <a:p>
+            <a:pPr algn="ctr"/>
+            <a:r>
+              <a:rPr lang="en-US" sz="900" dirty="0">
+                <a:solidFill>
+                  <a:schemeClr val="tx1"/>
+                </a:solidFill>
+              </a:rPr>
+              <a:t>Writing Implement</a:t>
+            </a:r>
+          </a:p>
+          <a:p>
+            <a:pPr algn="ctr"/>
+            <a:r>
+              <a:rPr lang="en-US" sz="900" dirty="0">
+                <a:solidFill>
+                  <a:schemeClr val="tx1"/>
+                </a:solidFill>
+              </a:rPr>
+              <a:t>Replacement </a:t>
+            </a:r>
+          </a:p>
+        </p:txBody>
+      </p:sp>
+      <p:sp>
+        <p:nvSpPr>
+          <p:cNvPr id="13" name="Oval 12"/>
+          <p:cNvSpPr/>
+          <p:nvPr/>
+        </p:nvSpPr>
+        <p:spPr>
+          <a:xfrm>
+            <a:off x="733455" y="1806381"/>
+            <a:ext cx="1108007" cy="1108007"/>
+          </a:xfrm>
+          <a:prstGeom prst="ellipse">
+            <a:avLst/>
+          </a:prstGeom>
+          <a:solidFill>
+            <a:schemeClr val="bg1"/>
+          </a:solidFill>
+          <a:ln>
+            <a:solidFill>
+              <a:schemeClr val="tx1"/>
+            </a:solidFill>
+          </a:ln>
+        </p:spPr>
+        <p:style>
+          <a:lnRef idx="2">
+            <a:schemeClr val="accent1">
+              <a:shade val="50000"/>
+            </a:schemeClr>
+          </a:lnRef>
+          <a:fillRef idx="1">
+            <a:schemeClr val="accent1"/>
+          </a:fillRef>
+          <a:effectRef idx="0">
+            <a:schemeClr val="accent1"/>
+          </a:effectRef>
+          <a:fontRef idx="minor">
+            <a:schemeClr val="lt1"/>
+          </a:fontRef>
+        </p:style>
+        <p:txBody>
+          <a:bodyPr rot="0" spcFirstLastPara="0" vertOverflow="overflow" horzOverflow="overflow" vert="horz" wrap="square" lIns="68580" tIns="34290" rIns="68580" bIns="34290" numCol="1" spcCol="0" rtlCol="0" fromWordArt="0" anchor="ctr" anchorCtr="0" forceAA="0" compatLnSpc="1">
+            <a:prstTxWarp prst="textNoShape">
+              <a:avLst/>
+            </a:prstTxWarp>
+            <a:noAutofit/>
+          </a:bodyPr>
+          <a:lstStyle/>
+          <a:p>
+            <a:pPr algn="ctr"/>
+            <a:r>
+              <a:rPr lang="en-US" sz="900" dirty="0">
+                <a:solidFill>
+                  <a:schemeClr val="tx1"/>
+                </a:solidFill>
+              </a:rPr>
+              <a:t>Environment</a:t>
+            </a:r>
+          </a:p>
+        </p:txBody>
+      </p:sp>
+      <p:sp>
+        <p:nvSpPr>
+          <p:cNvPr id="14" name="Oval 13"/>
+          <p:cNvSpPr/>
+          <p:nvPr/>
+        </p:nvSpPr>
+        <p:spPr>
+          <a:xfrm>
+            <a:off x="770024" y="3009162"/>
+            <a:ext cx="1108007" cy="1108007"/>
+          </a:xfrm>
+          <a:prstGeom prst="ellipse">
+            <a:avLst/>
+          </a:prstGeom>
+          <a:solidFill>
+            <a:schemeClr val="bg1"/>
+          </a:solidFill>
+          <a:ln>
+            <a:solidFill>
+              <a:schemeClr val="tx1"/>
+            </a:solidFill>
+          </a:ln>
+        </p:spPr>
+        <p:style>
+          <a:lnRef idx="2">
+            <a:schemeClr val="accent1">
+              <a:shade val="50000"/>
+            </a:schemeClr>
+          </a:lnRef>
+          <a:fillRef idx="1">
+            <a:schemeClr val="accent1"/>
+          </a:fillRef>
+          <a:effectRef idx="0">
+            <a:schemeClr val="accent1"/>
+          </a:effectRef>
+          <a:fontRef idx="minor">
+            <a:schemeClr val="lt1"/>
+          </a:fontRef>
+        </p:style>
+        <p:txBody>
+          <a:bodyPr rot="0" spcFirstLastPara="0" vertOverflow="overflow" horzOverflow="overflow" vert="horz" wrap="square" lIns="68580" tIns="34290" rIns="68580" bIns="34290" numCol="1" spcCol="0" rtlCol="0" fromWordArt="0" anchor="ctr" anchorCtr="0" forceAA="0" compatLnSpc="1">
+            <a:prstTxWarp prst="textNoShape">
+              <a:avLst/>
+            </a:prstTxWarp>
+            <a:noAutofit/>
+          </a:bodyPr>
+          <a:lstStyle/>
+          <a:p>
+            <a:pPr algn="ctr"/>
+            <a:r>
+              <a:rPr lang="en-US" sz="900" dirty="0">
+                <a:solidFill>
+                  <a:schemeClr val="tx1"/>
+                </a:solidFill>
+              </a:rPr>
+              <a:t>Writing Implement</a:t>
+            </a:r>
+          </a:p>
+        </p:txBody>
+      </p:sp>
+      <p:sp>
+        <p:nvSpPr>
+          <p:cNvPr id="15" name="Oval 14"/>
+          <p:cNvSpPr/>
+          <p:nvPr/>
+        </p:nvSpPr>
+        <p:spPr>
+          <a:xfrm>
+            <a:off x="733454" y="603600"/>
+            <a:ext cx="1108007" cy="1108007"/>
+          </a:xfrm>
+          <a:prstGeom prst="ellipse">
+            <a:avLst/>
+          </a:prstGeom>
+          <a:solidFill>
+            <a:schemeClr val="bg1"/>
+          </a:solidFill>
+          <a:ln>
+            <a:solidFill>
+              <a:schemeClr val="tx1"/>
+            </a:solidFill>
+          </a:ln>
+        </p:spPr>
+        <p:style>
+          <a:lnRef idx="2">
+            <a:schemeClr val="accent1">
+              <a:shade val="50000"/>
+            </a:schemeClr>
+          </a:lnRef>
+          <a:fillRef idx="1">
+            <a:schemeClr val="accent1"/>
+          </a:fillRef>
+          <a:effectRef idx="0">
+            <a:schemeClr val="accent1"/>
+          </a:effectRef>
+          <a:fontRef idx="minor">
+            <a:schemeClr val="lt1"/>
+          </a:fontRef>
+        </p:style>
+        <p:txBody>
+          <a:bodyPr rot="0" spcFirstLastPara="0" vertOverflow="overflow" horzOverflow="overflow" vert="horz" wrap="square" lIns="68580" tIns="34290" rIns="68580" bIns="34290" numCol="1" spcCol="0" rtlCol="0" fromWordArt="0" anchor="ctr" anchorCtr="0" forceAA="0" compatLnSpc="1">
+            <a:prstTxWarp prst="textNoShape">
+              <a:avLst/>
+            </a:prstTxWarp>
+            <a:noAutofit/>
+          </a:bodyPr>
+          <a:lstStyle/>
+          <a:p>
+            <a:pPr algn="ctr"/>
+            <a:r>
+              <a:rPr lang="en-US" sz="900" dirty="0">
+                <a:solidFill>
+                  <a:schemeClr val="tx1"/>
+                </a:solidFill>
+              </a:rPr>
+              <a:t>Human User</a:t>
+            </a:r>
+          </a:p>
+        </p:txBody>
+      </p:sp>
+      <p:sp>
+        <p:nvSpPr>
+          <p:cNvPr id="16" name="Oval 15"/>
+          <p:cNvSpPr/>
+          <p:nvPr/>
+        </p:nvSpPr>
+        <p:spPr>
+          <a:xfrm>
+            <a:off x="777275" y="4217146"/>
+            <a:ext cx="1108007" cy="1108007"/>
+          </a:xfrm>
+          <a:prstGeom prst="ellipse">
+            <a:avLst/>
+          </a:prstGeom>
+          <a:solidFill>
+            <a:schemeClr val="bg1"/>
+          </a:solidFill>
+          <a:ln>
+            <a:solidFill>
+              <a:schemeClr val="tx1"/>
+            </a:solidFill>
+          </a:ln>
+        </p:spPr>
+        <p:style>
+          <a:lnRef idx="2">
+            <a:schemeClr val="accent1">
+              <a:shade val="50000"/>
+            </a:schemeClr>
+          </a:lnRef>
+          <a:fillRef idx="1">
+            <a:schemeClr val="accent1"/>
+          </a:fillRef>
+          <a:effectRef idx="0">
+            <a:schemeClr val="accent1"/>
+          </a:effectRef>
+          <a:fontRef idx="minor">
+            <a:schemeClr val="lt1"/>
+          </a:fontRef>
+        </p:style>
+        <p:txBody>
+          <a:bodyPr rot="0" spcFirstLastPara="0" vertOverflow="overflow" horzOverflow="overflow" vert="horz" wrap="square" lIns="68580" tIns="34290" rIns="68580" bIns="34290" numCol="1" spcCol="0" rtlCol="0" fromWordArt="0" anchor="ctr" anchorCtr="0" forceAA="0" compatLnSpc="1">
+            <a:prstTxWarp prst="textNoShape">
+              <a:avLst/>
+            </a:prstTxWarp>
+            <a:noAutofit/>
+          </a:bodyPr>
+          <a:lstStyle/>
+          <a:p>
+            <a:pPr algn="ctr"/>
+            <a:r>
+              <a:rPr lang="en-US" sz="900" dirty="0">
+                <a:solidFill>
+                  <a:schemeClr val="tx1"/>
+                </a:solidFill>
+              </a:rPr>
+              <a:t>Input Image</a:t>
+            </a:r>
+          </a:p>
+        </p:txBody>
+      </p:sp>
+      <p:sp>
+        <p:nvSpPr>
+          <p:cNvPr id="17" name="Oval 16"/>
+          <p:cNvSpPr/>
+          <p:nvPr/>
+        </p:nvSpPr>
+        <p:spPr>
+          <a:xfrm>
+            <a:off x="777276" y="5427658"/>
+            <a:ext cx="1108007" cy="1108007"/>
+          </a:xfrm>
+          <a:prstGeom prst="ellipse">
+            <a:avLst/>
+          </a:prstGeom>
+          <a:solidFill>
+            <a:schemeClr val="bg1"/>
+          </a:solidFill>
+          <a:ln>
+            <a:solidFill>
+              <a:schemeClr val="tx1"/>
+            </a:solidFill>
+          </a:ln>
+        </p:spPr>
+        <p:style>
+          <a:lnRef idx="2">
+            <a:schemeClr val="accent1">
+              <a:shade val="50000"/>
+            </a:schemeClr>
+          </a:lnRef>
+          <a:fillRef idx="1">
+            <a:schemeClr val="accent1"/>
+          </a:fillRef>
+          <a:effectRef idx="0">
+            <a:schemeClr val="accent1"/>
+          </a:effectRef>
+          <a:fontRef idx="minor">
+            <a:schemeClr val="lt1"/>
+          </a:fontRef>
+        </p:style>
+        <p:txBody>
+          <a:bodyPr rot="0" spcFirstLastPara="0" vertOverflow="overflow" horzOverflow="overflow" vert="horz" wrap="square" lIns="68580" tIns="34290" rIns="68580" bIns="34290" numCol="1" spcCol="0" rtlCol="0" fromWordArt="0" anchor="ctr" anchorCtr="0" forceAA="0" compatLnSpc="1">
+            <a:prstTxWarp prst="textNoShape">
+              <a:avLst/>
+            </a:prstTxWarp>
+            <a:noAutofit/>
+          </a:bodyPr>
+          <a:lstStyle/>
+          <a:p>
+            <a:pPr algn="ctr"/>
+            <a:r>
+              <a:rPr lang="en-US" sz="900" dirty="0">
+                <a:solidFill>
+                  <a:schemeClr val="tx1"/>
+                </a:solidFill>
+              </a:rPr>
+              <a:t>Surface</a:t>
+            </a:r>
+          </a:p>
+        </p:txBody>
+      </p:sp>
+      <p:sp>
+        <p:nvSpPr>
+          <p:cNvPr id="19" name="Rectangle 18"/>
+          <p:cNvSpPr/>
+          <p:nvPr/>
+        </p:nvSpPr>
+        <p:spPr>
+          <a:xfrm>
+            <a:off x="5586804" y="1062517"/>
+            <a:ext cx="743863" cy="743863"/>
+          </a:xfrm>
+          <a:prstGeom prst="rect">
+            <a:avLst/>
+          </a:prstGeom>
+          <a:solidFill>
+            <a:schemeClr val="bg1"/>
+          </a:solidFill>
+          <a:ln>
+            <a:solidFill>
+              <a:schemeClr val="tx1"/>
+            </a:solidFill>
+          </a:ln>
+        </p:spPr>
+        <p:style>
+          <a:lnRef idx="2">
+            <a:schemeClr val="accent1">
+              <a:shade val="50000"/>
+            </a:schemeClr>
+          </a:lnRef>
+          <a:fillRef idx="1">
+            <a:schemeClr val="accent1"/>
+          </a:fillRef>
+          <a:effectRef idx="0">
+            <a:schemeClr val="accent1"/>
+          </a:effectRef>
+          <a:fontRef idx="minor">
+            <a:schemeClr val="lt1"/>
+          </a:fontRef>
+        </p:style>
+        <p:txBody>
+          <a:bodyPr rot="0" spcFirstLastPara="0" vertOverflow="overflow" horzOverflow="overflow" vert="horz" wrap="square" lIns="68580" tIns="34290" rIns="68580" bIns="34290" numCol="1" spcCol="0" rtlCol="0" fromWordArt="0" anchor="ctr" anchorCtr="0" forceAA="0" compatLnSpc="1">
+            <a:prstTxWarp prst="textNoShape">
+              <a:avLst/>
+            </a:prstTxWarp>
+            <a:noAutofit/>
+          </a:bodyPr>
+          <a:lstStyle/>
+          <a:p>
+            <a:pPr algn="ctr"/>
+            <a:r>
+              <a:rPr lang="en-US" sz="900" dirty="0">
+                <a:solidFill>
+                  <a:schemeClr val="tx1"/>
+                </a:solidFill>
+              </a:rPr>
+              <a:t>Localization</a:t>
+            </a:r>
+          </a:p>
+        </p:txBody>
+      </p:sp>
+      <p:sp>
+        <p:nvSpPr>
+          <p:cNvPr id="20" name="Rectangle 19"/>
+          <p:cNvSpPr/>
+          <p:nvPr/>
+        </p:nvSpPr>
+        <p:spPr>
+          <a:xfrm>
+            <a:off x="5593631" y="4668644"/>
+            <a:ext cx="761902" cy="761902"/>
+          </a:xfrm>
+          <a:prstGeom prst="rect">
+            <a:avLst/>
+          </a:prstGeom>
+          <a:solidFill>
+            <a:schemeClr val="bg1"/>
+          </a:solidFill>
+          <a:ln>
+            <a:solidFill>
+              <a:schemeClr val="tx1"/>
+            </a:solidFill>
+          </a:ln>
+        </p:spPr>
+        <p:style>
+          <a:lnRef idx="2">
+            <a:schemeClr val="accent1">
+              <a:shade val="50000"/>
+            </a:schemeClr>
+          </a:lnRef>
+          <a:fillRef idx="1">
+            <a:schemeClr val="accent1"/>
+          </a:fillRef>
+          <a:effectRef idx="0">
+            <a:schemeClr val="accent1"/>
+          </a:effectRef>
+          <a:fontRef idx="minor">
+            <a:schemeClr val="lt1"/>
+          </a:fontRef>
+        </p:style>
+        <p:txBody>
+          <a:bodyPr rot="0" spcFirstLastPara="0" vertOverflow="overflow" horzOverflow="overflow" vert="horz" wrap="square" lIns="68580" tIns="34290" rIns="68580" bIns="34290" numCol="1" spcCol="0" rtlCol="0" fromWordArt="0" anchor="ctr" anchorCtr="0" forceAA="0" compatLnSpc="1">
+            <a:prstTxWarp prst="textNoShape">
+              <a:avLst/>
+            </a:prstTxWarp>
+            <a:noAutofit/>
+          </a:bodyPr>
+          <a:lstStyle/>
+          <a:p>
+            <a:pPr algn="ctr"/>
+            <a:r>
+              <a:rPr lang="en-US" sz="900" dirty="0">
+                <a:solidFill>
+                  <a:schemeClr val="tx1"/>
+                </a:solidFill>
+              </a:rPr>
+              <a:t>Scheduling/ Planning</a:t>
+            </a:r>
+          </a:p>
+        </p:txBody>
+      </p:sp>
+      <p:sp>
+        <p:nvSpPr>
+          <p:cNvPr id="21" name="Rectangle 20"/>
+          <p:cNvSpPr/>
+          <p:nvPr/>
+        </p:nvSpPr>
+        <p:spPr>
+          <a:xfrm>
+            <a:off x="5593630" y="5634308"/>
+            <a:ext cx="766491" cy="766491"/>
+          </a:xfrm>
+          <a:prstGeom prst="rect">
+            <a:avLst/>
+          </a:prstGeom>
+          <a:solidFill>
+            <a:schemeClr val="bg1"/>
+          </a:solidFill>
+          <a:ln>
+            <a:solidFill>
+              <a:schemeClr val="tx1"/>
+            </a:solidFill>
+          </a:ln>
+        </p:spPr>
+        <p:style>
+          <a:lnRef idx="2">
+            <a:schemeClr val="accent1">
+              <a:shade val="50000"/>
+            </a:schemeClr>
+          </a:lnRef>
+          <a:fillRef idx="1">
+            <a:schemeClr val="accent1"/>
+          </a:fillRef>
+          <a:effectRef idx="0">
+            <a:schemeClr val="accent1"/>
+          </a:effectRef>
+          <a:fontRef idx="minor">
+            <a:schemeClr val="lt1"/>
+          </a:fontRef>
+        </p:style>
+        <p:txBody>
+          <a:bodyPr rot="0" spcFirstLastPara="0" vertOverflow="overflow" horzOverflow="overflow" vert="horz" wrap="square" lIns="68580" tIns="34290" rIns="68580" bIns="34290" numCol="1" spcCol="0" rtlCol="0" fromWordArt="0" anchor="ctr" anchorCtr="0" forceAA="0" compatLnSpc="1">
+            <a:prstTxWarp prst="textNoShape">
+              <a:avLst/>
+            </a:prstTxWarp>
+            <a:noAutofit/>
+          </a:bodyPr>
+          <a:lstStyle/>
+          <a:p>
+            <a:pPr algn="ctr"/>
+            <a:r>
+              <a:rPr lang="en-US" sz="900" dirty="0">
+                <a:solidFill>
+                  <a:schemeClr val="tx1"/>
+                </a:solidFill>
+              </a:rPr>
+              <a:t>Locomotion</a:t>
+            </a:r>
+          </a:p>
+        </p:txBody>
+      </p:sp>
+      <p:sp>
+        <p:nvSpPr>
+          <p:cNvPr id="22" name="Rectangle 21"/>
+          <p:cNvSpPr/>
+          <p:nvPr/>
+        </p:nvSpPr>
+        <p:spPr>
+          <a:xfrm>
+            <a:off x="4530001" y="2880138"/>
+            <a:ext cx="775329" cy="775329"/>
+          </a:xfrm>
+          <a:prstGeom prst="rect">
+            <a:avLst/>
+          </a:prstGeom>
+          <a:solidFill>
+            <a:schemeClr val="bg1"/>
+          </a:solidFill>
+          <a:ln>
+            <a:solidFill>
+              <a:schemeClr val="tx1"/>
+            </a:solidFill>
+          </a:ln>
+        </p:spPr>
+        <p:style>
+          <a:lnRef idx="2">
+            <a:schemeClr val="accent1">
+              <a:shade val="50000"/>
+            </a:schemeClr>
+          </a:lnRef>
+          <a:fillRef idx="1">
+            <a:schemeClr val="accent1"/>
+          </a:fillRef>
+          <a:effectRef idx="0">
+            <a:schemeClr val="accent1"/>
+          </a:effectRef>
+          <a:fontRef idx="minor">
+            <a:schemeClr val="lt1"/>
+          </a:fontRef>
+        </p:style>
+        <p:txBody>
+          <a:bodyPr rot="0" spcFirstLastPara="0" vertOverflow="overflow" horzOverflow="overflow" vert="horz" wrap="square" lIns="68580" tIns="34290" rIns="68580" bIns="34290" numCol="1" spcCol="0" rtlCol="0" fromWordArt="0" anchor="ctr" anchorCtr="0" forceAA="0" compatLnSpc="1">
+            <a:prstTxWarp prst="textNoShape">
+              <a:avLst/>
+            </a:prstTxWarp>
+            <a:noAutofit/>
+          </a:bodyPr>
+          <a:lstStyle/>
+          <a:p>
+            <a:pPr algn="ctr"/>
+            <a:r>
+              <a:rPr lang="en-US" sz="900" dirty="0">
+                <a:solidFill>
+                  <a:schemeClr val="tx1"/>
+                </a:solidFill>
+              </a:rPr>
+              <a:t>Writing Implement Actuation</a:t>
+            </a:r>
+          </a:p>
+        </p:txBody>
+      </p:sp>
+      <p:cxnSp>
+        <p:nvCxnSpPr>
+          <p:cNvPr id="24" name="Straight Connector 23"/>
+          <p:cNvCxnSpPr>
+            <a:stCxn id="15" idx="6"/>
+            <a:endCxn id="7" idx="1"/>
+          </p:cNvCxnSpPr>
+          <p:nvPr/>
+        </p:nvCxnSpPr>
+        <p:spPr>
+          <a:xfrm>
+            <a:off x="1841461" y="1157604"/>
+            <a:ext cx="2695600" cy="1238288"/>
+          </a:xfrm>
+          <a:prstGeom prst="line">
+            <a:avLst/>
+          </a:prstGeom>
+          <a:ln/>
+        </p:spPr>
+        <p:style>
+          <a:lnRef idx="1">
+            <a:schemeClr val="dk1"/>
+          </a:lnRef>
+          <a:fillRef idx="0">
+            <a:schemeClr val="dk1"/>
+          </a:fillRef>
+          <a:effectRef idx="0">
+            <a:schemeClr val="dk1"/>
+          </a:effectRef>
+          <a:fontRef idx="minor">
+            <a:schemeClr val="tx1"/>
+          </a:fontRef>
+        </p:style>
+      </p:cxnSp>
+      <p:cxnSp>
+        <p:nvCxnSpPr>
+          <p:cNvPr id="29" name="Straight Connector 28"/>
+          <p:cNvCxnSpPr>
+            <a:stCxn id="14" idx="6"/>
+            <a:endCxn id="7" idx="1"/>
+          </p:cNvCxnSpPr>
+          <p:nvPr/>
+        </p:nvCxnSpPr>
+        <p:spPr>
+          <a:xfrm flipV="1">
+            <a:off x="1878031" y="2395892"/>
+            <a:ext cx="2659030" cy="1167274"/>
+          </a:xfrm>
+          <a:prstGeom prst="line">
+            <a:avLst/>
+          </a:prstGeom>
+          <a:ln/>
+        </p:spPr>
+        <p:style>
+          <a:lnRef idx="1">
+            <a:schemeClr val="dk1"/>
+          </a:lnRef>
+          <a:fillRef idx="0">
+            <a:schemeClr val="dk1"/>
+          </a:fillRef>
+          <a:effectRef idx="0">
+            <a:schemeClr val="dk1"/>
+          </a:effectRef>
+          <a:fontRef idx="minor">
+            <a:schemeClr val="tx1"/>
+          </a:fontRef>
+        </p:style>
+      </p:cxnSp>
+      <p:cxnSp>
+        <p:nvCxnSpPr>
+          <p:cNvPr id="32" name="Straight Connector 31"/>
+          <p:cNvCxnSpPr>
+            <a:stCxn id="13" idx="6"/>
+            <a:endCxn id="19" idx="1"/>
+          </p:cNvCxnSpPr>
+          <p:nvPr/>
+        </p:nvCxnSpPr>
+        <p:spPr>
+          <a:xfrm flipV="1">
+            <a:off x="1841462" y="1434449"/>
+            <a:ext cx="3745342" cy="925936"/>
+          </a:xfrm>
+          <a:prstGeom prst="line">
+            <a:avLst/>
+          </a:prstGeom>
+          <a:ln/>
+        </p:spPr>
+        <p:style>
+          <a:lnRef idx="1">
+            <a:schemeClr val="dk1"/>
+          </a:lnRef>
+          <a:fillRef idx="0">
+            <a:schemeClr val="dk1"/>
+          </a:fillRef>
+          <a:effectRef idx="0">
+            <a:schemeClr val="dk1"/>
+          </a:effectRef>
+          <a:fontRef idx="minor">
+            <a:schemeClr val="tx1"/>
+          </a:fontRef>
+        </p:style>
+      </p:cxnSp>
+      <p:cxnSp>
+        <p:nvCxnSpPr>
+          <p:cNvPr id="35" name="Straight Connector 34"/>
+          <p:cNvCxnSpPr>
+            <a:stCxn id="16" idx="6"/>
+            <a:endCxn id="39" idx="1"/>
+          </p:cNvCxnSpPr>
+          <p:nvPr/>
+        </p:nvCxnSpPr>
+        <p:spPr>
+          <a:xfrm flipV="1">
+            <a:off x="1885282" y="4137949"/>
+            <a:ext cx="2644719" cy="633201"/>
+          </a:xfrm>
+          <a:prstGeom prst="line">
+            <a:avLst/>
+          </a:prstGeom>
+          <a:ln/>
+        </p:spPr>
+        <p:style>
+          <a:lnRef idx="1">
+            <a:schemeClr val="dk1"/>
+          </a:lnRef>
+          <a:fillRef idx="0">
+            <a:schemeClr val="dk1"/>
+          </a:fillRef>
+          <a:effectRef idx="0">
+            <a:schemeClr val="dk1"/>
+          </a:effectRef>
+          <a:fontRef idx="minor">
+            <a:schemeClr val="tx1"/>
+          </a:fontRef>
+        </p:style>
+      </p:cxnSp>
+      <p:sp>
+        <p:nvSpPr>
+          <p:cNvPr id="39" name="Rectangle 38"/>
+          <p:cNvSpPr/>
+          <p:nvPr/>
+        </p:nvSpPr>
+        <p:spPr>
+          <a:xfrm>
+            <a:off x="4530001" y="3748520"/>
+            <a:ext cx="778857" cy="778857"/>
+          </a:xfrm>
+          <a:prstGeom prst="rect">
+            <a:avLst/>
+          </a:prstGeom>
+          <a:solidFill>
+            <a:schemeClr val="bg1"/>
+          </a:solidFill>
+          <a:ln>
+            <a:solidFill>
+              <a:schemeClr val="tx1"/>
+            </a:solidFill>
+          </a:ln>
+        </p:spPr>
+        <p:style>
+          <a:lnRef idx="2">
+            <a:schemeClr val="accent1">
+              <a:shade val="50000"/>
+            </a:schemeClr>
+          </a:lnRef>
+          <a:fillRef idx="1">
+            <a:schemeClr val="accent1"/>
+          </a:fillRef>
+          <a:effectRef idx="0">
+            <a:schemeClr val="accent1"/>
+          </a:effectRef>
+          <a:fontRef idx="minor">
+            <a:schemeClr val="lt1"/>
+          </a:fontRef>
+        </p:style>
+        <p:txBody>
+          <a:bodyPr rot="0" spcFirstLastPara="0" vertOverflow="overflow" horzOverflow="overflow" vert="horz" wrap="square" lIns="68580" tIns="34290" rIns="68580" bIns="34290" numCol="1" spcCol="0" rtlCol="0" fromWordArt="0" anchor="ctr" anchorCtr="0" forceAA="0" compatLnSpc="1">
+            <a:prstTxWarp prst="textNoShape">
+              <a:avLst/>
+            </a:prstTxWarp>
+            <a:noAutofit/>
+          </a:bodyPr>
+          <a:lstStyle/>
+          <a:p>
+            <a:pPr algn="ctr"/>
+            <a:r>
+              <a:rPr lang="en-US" sz="900" dirty="0">
+                <a:solidFill>
+                  <a:schemeClr val="tx1"/>
+                </a:solidFill>
+              </a:rPr>
+              <a:t>Input Image Processing</a:t>
+            </a:r>
+          </a:p>
+        </p:txBody>
+      </p:sp>
+      <p:cxnSp>
+        <p:nvCxnSpPr>
+          <p:cNvPr id="43" name="Straight Connector 42"/>
+          <p:cNvCxnSpPr>
+            <a:stCxn id="15" idx="6"/>
+            <a:endCxn id="39" idx="1"/>
+          </p:cNvCxnSpPr>
+          <p:nvPr/>
+        </p:nvCxnSpPr>
+        <p:spPr>
+          <a:xfrm>
+            <a:off x="1841461" y="1157604"/>
+            <a:ext cx="2688540" cy="2980345"/>
+          </a:xfrm>
+          <a:prstGeom prst="line">
+            <a:avLst/>
+          </a:prstGeom>
+          <a:ln/>
+        </p:spPr>
+        <p:style>
+          <a:lnRef idx="1">
+            <a:schemeClr val="dk1"/>
+          </a:lnRef>
+          <a:fillRef idx="0">
+            <a:schemeClr val="dk1"/>
+          </a:fillRef>
+          <a:effectRef idx="0">
+            <a:schemeClr val="dk1"/>
+          </a:effectRef>
+          <a:fontRef idx="minor">
+            <a:schemeClr val="tx1"/>
+          </a:fontRef>
+        </p:style>
+      </p:cxnSp>
+      <p:cxnSp>
+        <p:nvCxnSpPr>
+          <p:cNvPr id="46" name="Straight Connector 45"/>
+          <p:cNvCxnSpPr>
+            <a:stCxn id="17" idx="6"/>
+            <a:endCxn id="21" idx="1"/>
+          </p:cNvCxnSpPr>
+          <p:nvPr/>
+        </p:nvCxnSpPr>
+        <p:spPr>
+          <a:xfrm>
+            <a:off x="1885283" y="5981662"/>
+            <a:ext cx="3708347" cy="35892"/>
+          </a:xfrm>
+          <a:prstGeom prst="line">
+            <a:avLst/>
+          </a:prstGeom>
+          <a:ln/>
+        </p:spPr>
+        <p:style>
+          <a:lnRef idx="1">
+            <a:schemeClr val="dk1"/>
+          </a:lnRef>
+          <a:fillRef idx="0">
+            <a:schemeClr val="dk1"/>
+          </a:fillRef>
+          <a:effectRef idx="0">
+            <a:schemeClr val="dk1"/>
+          </a:effectRef>
+          <a:fontRef idx="minor">
+            <a:schemeClr val="tx1"/>
+          </a:fontRef>
+        </p:style>
+      </p:cxnSp>
+      <p:cxnSp>
+        <p:nvCxnSpPr>
+          <p:cNvPr id="49" name="Straight Connector 48"/>
+          <p:cNvCxnSpPr>
+            <a:stCxn id="14" idx="6"/>
+            <a:endCxn id="22" idx="1"/>
+          </p:cNvCxnSpPr>
+          <p:nvPr/>
+        </p:nvCxnSpPr>
+        <p:spPr>
+          <a:xfrm flipV="1">
+            <a:off x="1878031" y="3267803"/>
+            <a:ext cx="2651970" cy="295363"/>
+          </a:xfrm>
+          <a:prstGeom prst="line">
+            <a:avLst/>
+          </a:prstGeom>
+          <a:ln/>
+        </p:spPr>
+        <p:style>
+          <a:lnRef idx="1">
+            <a:schemeClr val="dk1"/>
+          </a:lnRef>
+          <a:fillRef idx="0">
+            <a:schemeClr val="dk1"/>
+          </a:fillRef>
+          <a:effectRef idx="0">
+            <a:schemeClr val="dk1"/>
+          </a:effectRef>
+          <a:fontRef idx="minor">
+            <a:schemeClr val="tx1"/>
+          </a:fontRef>
+        </p:style>
+      </p:cxnSp>
+      <p:cxnSp>
+        <p:nvCxnSpPr>
+          <p:cNvPr id="54" name="Straight Connector 53"/>
+          <p:cNvCxnSpPr>
+            <a:stCxn id="20" idx="0"/>
+            <a:endCxn id="19" idx="2"/>
+          </p:cNvCxnSpPr>
+          <p:nvPr/>
+        </p:nvCxnSpPr>
+        <p:spPr>
+          <a:xfrm flipH="1" flipV="1">
+            <a:off x="5958736" y="1806380"/>
+            <a:ext cx="15846" cy="2862264"/>
+          </a:xfrm>
+          <a:prstGeom prst="line">
+            <a:avLst/>
+          </a:prstGeom>
+          <a:ln/>
+        </p:spPr>
+        <p:style>
+          <a:lnRef idx="1">
+            <a:schemeClr val="dk1"/>
+          </a:lnRef>
+          <a:fillRef idx="0">
+            <a:schemeClr val="dk1"/>
+          </a:fillRef>
+          <a:effectRef idx="0">
+            <a:schemeClr val="dk1"/>
+          </a:effectRef>
+          <a:fontRef idx="minor">
+            <a:schemeClr val="tx1"/>
+          </a:fontRef>
+        </p:style>
+      </p:cxnSp>
+      <p:cxnSp>
+        <p:nvCxnSpPr>
+          <p:cNvPr id="57" name="Straight Connector 56"/>
+          <p:cNvCxnSpPr>
+            <a:stCxn id="39" idx="3"/>
+            <a:endCxn id="20" idx="0"/>
+          </p:cNvCxnSpPr>
+          <p:nvPr/>
+        </p:nvCxnSpPr>
+        <p:spPr>
+          <a:xfrm>
+            <a:off x="5308858" y="4137949"/>
+            <a:ext cx="665724" cy="530695"/>
+          </a:xfrm>
+          <a:prstGeom prst="line">
+            <a:avLst/>
+          </a:prstGeom>
+          <a:ln/>
+        </p:spPr>
+        <p:style>
+          <a:lnRef idx="1">
+            <a:schemeClr val="dk1"/>
+          </a:lnRef>
+          <a:fillRef idx="0">
+            <a:schemeClr val="dk1"/>
+          </a:fillRef>
+          <a:effectRef idx="0">
+            <a:schemeClr val="dk1"/>
+          </a:effectRef>
+          <a:fontRef idx="minor">
+            <a:schemeClr val="tx1"/>
+          </a:fontRef>
+        </p:style>
+      </p:cxnSp>
+      <p:cxnSp>
+        <p:nvCxnSpPr>
+          <p:cNvPr id="64" name="Straight Connector 63"/>
+          <p:cNvCxnSpPr>
+            <a:stCxn id="20" idx="2"/>
+            <a:endCxn id="21" idx="0"/>
+          </p:cNvCxnSpPr>
+          <p:nvPr/>
+        </p:nvCxnSpPr>
+        <p:spPr>
+          <a:xfrm>
+            <a:off x="5974582" y="5430546"/>
+            <a:ext cx="2294" cy="203762"/>
+          </a:xfrm>
+          <a:prstGeom prst="line">
+            <a:avLst/>
+          </a:prstGeom>
+          <a:ln/>
+        </p:spPr>
+        <p:style>
+          <a:lnRef idx="1">
+            <a:schemeClr val="dk1"/>
+          </a:lnRef>
+          <a:fillRef idx="0">
+            <a:schemeClr val="dk1"/>
+          </a:fillRef>
+          <a:effectRef idx="0">
+            <a:schemeClr val="dk1"/>
+          </a:effectRef>
+          <a:fontRef idx="minor">
+            <a:schemeClr val="tx1"/>
+          </a:fontRef>
+        </p:style>
+      </p:cxnSp>
+    </p:spTree>
+    <p:extLst>
+      <p:ext uri="{BB962C8B-B14F-4D97-AF65-F5344CB8AC3E}">
+        <p14:creationId xmlns:p14="http://schemas.microsoft.com/office/powerpoint/2010/main" val="1736156027"/>
       </p:ext>
     </p:extLst>
   </p:cSld>

</xml_diff>